<commit_message>
mexi no power point e add a foto do site
</commit_message>
<xml_diff>
--- a/Documentação/Light ON.pptx
+++ b/Documentação/Light ON.pptx
@@ -5,21 +5,25 @@
     <p:sldMasterId id="2147483905" r:id="rId4"/>
   </p:sldMasterIdLst>
   <p:notesMasterIdLst>
-    <p:notesMasterId r:id="rId14"/>
+    <p:notesMasterId r:id="rId18"/>
   </p:notesMasterIdLst>
   <p:handoutMasterIdLst>
-    <p:handoutMasterId r:id="rId15"/>
+    <p:handoutMasterId r:id="rId19"/>
   </p:handoutMasterIdLst>
   <p:sldIdLst>
     <p:sldId id="278" r:id="rId5"/>
     <p:sldId id="279" r:id="rId6"/>
     <p:sldId id="280" r:id="rId7"/>
-    <p:sldId id="281" r:id="rId8"/>
-    <p:sldId id="282" r:id="rId9"/>
-    <p:sldId id="283" r:id="rId10"/>
+    <p:sldId id="283" r:id="rId8"/>
+    <p:sldId id="281" r:id="rId9"/>
+    <p:sldId id="282" r:id="rId10"/>
     <p:sldId id="284" r:id="rId11"/>
     <p:sldId id="285" r:id="rId12"/>
     <p:sldId id="286" r:id="rId13"/>
+    <p:sldId id="287" r:id="rId14"/>
+    <p:sldId id="288" r:id="rId15"/>
+    <p:sldId id="289" r:id="rId16"/>
+    <p:sldId id="290" r:id="rId17"/>
   </p:sldIdLst>
   <p:sldSz cx="12192000" cy="6858000"/>
   <p:notesSz cx="6858000" cy="9144000"/>
@@ -211,7 +215,7 @@
           <a:p>
             <a:fld id="{CAF05132-4288-4164-B1CA-F5AC1CC796A7}" type="datetime1">
               <a:rPr lang="pt-BR" smtClean="0"/>
-              <a:t>10/03/2022</a:t>
+              <a:t>13/03/2022</a:t>
             </a:fld>
             <a:endParaRPr lang="pt-BR" dirty="0"/>
           </a:p>
@@ -379,7 +383,7 @@
             <a:pPr rtl="0"/>
             <a:fld id="{437FA0DA-72A3-424F-8A35-066434C5B9F1}" type="datetime1">
               <a:rPr lang="pt-BR" noProof="0" smtClean="0"/>
-              <a:t>10/03/2022</a:t>
+              <a:t>13/03/2022</a:t>
             </a:fld>
             <a:endParaRPr lang="pt-BR" noProof="0" dirty="0"/>
           </a:p>
@@ -735,6 +739,586 @@
 </p:notes>
 </file>
 
+<file path=ppt/notesSlides/notesSlide10.xml><?xml version="1.0" encoding="utf-8"?>
+<p:notes xmlns:a="http://schemas.openxmlformats.org/drawingml/2006/main" xmlns:r="http://schemas.openxmlformats.org/officeDocument/2006/relationships" xmlns:p="http://schemas.openxmlformats.org/presentationml/2006/main">
+  <p:cSld>
+    <p:spTree>
+      <p:nvGrpSpPr>
+        <p:cNvPr id="1" name=""/>
+        <p:cNvGrpSpPr/>
+        <p:nvPr/>
+      </p:nvGrpSpPr>
+      <p:grpSpPr>
+        <a:xfrm>
+          <a:off x="0" y="0"/>
+          <a:ext cx="0" cy="0"/>
+          <a:chOff x="0" y="0"/>
+          <a:chExt cx="0" cy="0"/>
+        </a:xfrm>
+      </p:grpSpPr>
+      <p:sp>
+        <p:nvSpPr>
+          <p:cNvPr id="2" name="Espaço Reservado para Imagem do Slide 1"/>
+          <p:cNvSpPr>
+            <a:spLocks noGrp="1" noRot="1" noChangeAspect="1"/>
+          </p:cNvSpPr>
+          <p:nvPr>
+            <p:ph type="sldImg"/>
+          </p:nvPr>
+        </p:nvSpPr>
+        <p:spPr/>
+      </p:sp>
+      <p:sp>
+        <p:nvSpPr>
+          <p:cNvPr id="3" name="Espaço reservado para anotações 2"/>
+          <p:cNvSpPr>
+            <a:spLocks noGrp="1"/>
+          </p:cNvSpPr>
+          <p:nvPr>
+            <p:ph type="body" idx="1"/>
+          </p:nvPr>
+        </p:nvSpPr>
+        <p:spPr/>
+        <p:txBody>
+          <a:bodyPr rtlCol="0"/>
+          <a:lstStyle/>
+          <a:p>
+            <a:pPr rtl="0"/>
+            <a:endParaRPr lang="pt-BR" dirty="0"/>
+          </a:p>
+        </p:txBody>
+      </p:sp>
+      <p:sp>
+        <p:nvSpPr>
+          <p:cNvPr id="4" name="Espaço Reservado para o Número do Slide 3"/>
+          <p:cNvSpPr>
+            <a:spLocks noGrp="1"/>
+          </p:cNvSpPr>
+          <p:nvPr>
+            <p:ph type="sldNum" sz="quarter" idx="5"/>
+          </p:nvPr>
+        </p:nvSpPr>
+        <p:spPr/>
+        <p:txBody>
+          <a:bodyPr rtlCol="0"/>
+          <a:lstStyle/>
+          <a:p>
+            <a:pPr marL="0" marR="0" lvl="0" indent="0" algn="r" defTabSz="914400" rtl="0" eaLnBrk="1" fontAlgn="auto" latinLnBrk="0" hangingPunct="1">
+              <a:lnSpc>
+                <a:spcPct val="100000"/>
+              </a:lnSpc>
+              <a:spcBef>
+                <a:spcPts val="0"/>
+              </a:spcBef>
+              <a:spcAft>
+                <a:spcPts val="0"/>
+              </a:spcAft>
+              <a:buClrTx/>
+              <a:buSzTx/>
+              <a:buFontTx/>
+              <a:buNone/>
+              <a:tabLst/>
+              <a:defRPr/>
+            </a:pPr>
+            <a:fld id="{33AEA074-24A7-4657-AE02-A51F68EA6AA2}" type="slidenum">
+              <a:rPr kumimoji="0" lang="pt-BR" sz="1200" b="0" i="0" u="none" strike="noStrike" kern="1200" cap="none" spc="0" normalizeH="0" baseline="0" smtClean="0">
+                <a:ln>
+                  <a:noFill/>
+                </a:ln>
+                <a:solidFill>
+                  <a:prstClr val="black"/>
+                </a:solidFill>
+                <a:effectLst/>
+                <a:uLnTx/>
+                <a:uFillTx/>
+                <a:latin typeface="Calibri" panose="020F0502020204030204"/>
+                <a:ea typeface="+mn-ea"/>
+                <a:cs typeface="+mn-cs"/>
+              </a:rPr>
+              <a:pPr marL="0" marR="0" lvl="0" indent="0" algn="r" defTabSz="914400" rtl="0" eaLnBrk="1" fontAlgn="auto" latinLnBrk="0" hangingPunct="1">
+                <a:lnSpc>
+                  <a:spcPct val="100000"/>
+                </a:lnSpc>
+                <a:spcBef>
+                  <a:spcPts val="0"/>
+                </a:spcBef>
+                <a:spcAft>
+                  <a:spcPts val="0"/>
+                </a:spcAft>
+                <a:buClrTx/>
+                <a:buSzTx/>
+                <a:buFontTx/>
+                <a:buNone/>
+                <a:tabLst/>
+                <a:defRPr/>
+              </a:pPr>
+              <a:t>10</a:t>
+            </a:fld>
+            <a:endParaRPr kumimoji="0" lang="pt-BR" sz="1200" b="0" i="0" u="none" strike="noStrike" kern="1200" cap="none" spc="0" normalizeH="0" baseline="0" dirty="0">
+              <a:ln>
+                <a:noFill/>
+              </a:ln>
+              <a:solidFill>
+                <a:prstClr val="black"/>
+              </a:solidFill>
+              <a:effectLst/>
+              <a:uLnTx/>
+              <a:uFillTx/>
+              <a:latin typeface="Calibri" panose="020F0502020204030204"/>
+              <a:ea typeface="+mn-ea"/>
+              <a:cs typeface="+mn-cs"/>
+            </a:endParaRPr>
+          </a:p>
+        </p:txBody>
+      </p:sp>
+    </p:spTree>
+    <p:extLst>
+      <p:ext uri="{BB962C8B-B14F-4D97-AF65-F5344CB8AC3E}">
+        <p14:creationId xmlns:p14="http://schemas.microsoft.com/office/powerpoint/2010/main" val="4065570518"/>
+      </p:ext>
+    </p:extLst>
+  </p:cSld>
+  <p:clrMapOvr>
+    <a:masterClrMapping/>
+  </p:clrMapOvr>
+</p:notes>
+</file>
+
+<file path=ppt/notesSlides/notesSlide11.xml><?xml version="1.0" encoding="utf-8"?>
+<p:notes xmlns:a="http://schemas.openxmlformats.org/drawingml/2006/main" xmlns:r="http://schemas.openxmlformats.org/officeDocument/2006/relationships" xmlns:p="http://schemas.openxmlformats.org/presentationml/2006/main">
+  <p:cSld>
+    <p:spTree>
+      <p:nvGrpSpPr>
+        <p:cNvPr id="1" name=""/>
+        <p:cNvGrpSpPr/>
+        <p:nvPr/>
+      </p:nvGrpSpPr>
+      <p:grpSpPr>
+        <a:xfrm>
+          <a:off x="0" y="0"/>
+          <a:ext cx="0" cy="0"/>
+          <a:chOff x="0" y="0"/>
+          <a:chExt cx="0" cy="0"/>
+        </a:xfrm>
+      </p:grpSpPr>
+      <p:sp>
+        <p:nvSpPr>
+          <p:cNvPr id="2" name="Espaço Reservado para Imagem do Slide 1"/>
+          <p:cNvSpPr>
+            <a:spLocks noGrp="1" noRot="1" noChangeAspect="1"/>
+          </p:cNvSpPr>
+          <p:nvPr>
+            <p:ph type="sldImg"/>
+          </p:nvPr>
+        </p:nvSpPr>
+        <p:spPr/>
+      </p:sp>
+      <p:sp>
+        <p:nvSpPr>
+          <p:cNvPr id="3" name="Espaço reservado para anotações 2"/>
+          <p:cNvSpPr>
+            <a:spLocks noGrp="1"/>
+          </p:cNvSpPr>
+          <p:nvPr>
+            <p:ph type="body" idx="1"/>
+          </p:nvPr>
+        </p:nvSpPr>
+        <p:spPr/>
+        <p:txBody>
+          <a:bodyPr rtlCol="0"/>
+          <a:lstStyle/>
+          <a:p>
+            <a:pPr rtl="0"/>
+            <a:endParaRPr lang="pt-BR" dirty="0"/>
+          </a:p>
+        </p:txBody>
+      </p:sp>
+      <p:sp>
+        <p:nvSpPr>
+          <p:cNvPr id="4" name="Espaço Reservado para o Número do Slide 3"/>
+          <p:cNvSpPr>
+            <a:spLocks noGrp="1"/>
+          </p:cNvSpPr>
+          <p:nvPr>
+            <p:ph type="sldNum" sz="quarter" idx="5"/>
+          </p:nvPr>
+        </p:nvSpPr>
+        <p:spPr/>
+        <p:txBody>
+          <a:bodyPr rtlCol="0"/>
+          <a:lstStyle/>
+          <a:p>
+            <a:pPr marL="0" marR="0" lvl="0" indent="0" algn="r" defTabSz="914400" rtl="0" eaLnBrk="1" fontAlgn="auto" latinLnBrk="0" hangingPunct="1">
+              <a:lnSpc>
+                <a:spcPct val="100000"/>
+              </a:lnSpc>
+              <a:spcBef>
+                <a:spcPts val="0"/>
+              </a:spcBef>
+              <a:spcAft>
+                <a:spcPts val="0"/>
+              </a:spcAft>
+              <a:buClrTx/>
+              <a:buSzTx/>
+              <a:buFontTx/>
+              <a:buNone/>
+              <a:tabLst/>
+              <a:defRPr/>
+            </a:pPr>
+            <a:fld id="{33AEA074-24A7-4657-AE02-A51F68EA6AA2}" type="slidenum">
+              <a:rPr kumimoji="0" lang="pt-BR" sz="1200" b="0" i="0" u="none" strike="noStrike" kern="1200" cap="none" spc="0" normalizeH="0" baseline="0" smtClean="0">
+                <a:ln>
+                  <a:noFill/>
+                </a:ln>
+                <a:solidFill>
+                  <a:prstClr val="black"/>
+                </a:solidFill>
+                <a:effectLst/>
+                <a:uLnTx/>
+                <a:uFillTx/>
+                <a:latin typeface="Calibri" panose="020F0502020204030204"/>
+                <a:ea typeface="+mn-ea"/>
+                <a:cs typeface="+mn-cs"/>
+              </a:rPr>
+              <a:pPr marL="0" marR="0" lvl="0" indent="0" algn="r" defTabSz="914400" rtl="0" eaLnBrk="1" fontAlgn="auto" latinLnBrk="0" hangingPunct="1">
+                <a:lnSpc>
+                  <a:spcPct val="100000"/>
+                </a:lnSpc>
+                <a:spcBef>
+                  <a:spcPts val="0"/>
+                </a:spcBef>
+                <a:spcAft>
+                  <a:spcPts val="0"/>
+                </a:spcAft>
+                <a:buClrTx/>
+                <a:buSzTx/>
+                <a:buFontTx/>
+                <a:buNone/>
+                <a:tabLst/>
+                <a:defRPr/>
+              </a:pPr>
+              <a:t>11</a:t>
+            </a:fld>
+            <a:endParaRPr kumimoji="0" lang="pt-BR" sz="1200" b="0" i="0" u="none" strike="noStrike" kern="1200" cap="none" spc="0" normalizeH="0" baseline="0" dirty="0">
+              <a:ln>
+                <a:noFill/>
+              </a:ln>
+              <a:solidFill>
+                <a:prstClr val="black"/>
+              </a:solidFill>
+              <a:effectLst/>
+              <a:uLnTx/>
+              <a:uFillTx/>
+              <a:latin typeface="Calibri" panose="020F0502020204030204"/>
+              <a:ea typeface="+mn-ea"/>
+              <a:cs typeface="+mn-cs"/>
+            </a:endParaRPr>
+          </a:p>
+        </p:txBody>
+      </p:sp>
+    </p:spTree>
+    <p:extLst>
+      <p:ext uri="{BB962C8B-B14F-4D97-AF65-F5344CB8AC3E}">
+        <p14:creationId xmlns:p14="http://schemas.microsoft.com/office/powerpoint/2010/main" val="3315343338"/>
+      </p:ext>
+    </p:extLst>
+  </p:cSld>
+  <p:clrMapOvr>
+    <a:masterClrMapping/>
+  </p:clrMapOvr>
+</p:notes>
+</file>
+
+<file path=ppt/notesSlides/notesSlide12.xml><?xml version="1.0" encoding="utf-8"?>
+<p:notes xmlns:a="http://schemas.openxmlformats.org/drawingml/2006/main" xmlns:r="http://schemas.openxmlformats.org/officeDocument/2006/relationships" xmlns:p="http://schemas.openxmlformats.org/presentationml/2006/main">
+  <p:cSld>
+    <p:spTree>
+      <p:nvGrpSpPr>
+        <p:cNvPr id="1" name=""/>
+        <p:cNvGrpSpPr/>
+        <p:nvPr/>
+      </p:nvGrpSpPr>
+      <p:grpSpPr>
+        <a:xfrm>
+          <a:off x="0" y="0"/>
+          <a:ext cx="0" cy="0"/>
+          <a:chOff x="0" y="0"/>
+          <a:chExt cx="0" cy="0"/>
+        </a:xfrm>
+      </p:grpSpPr>
+      <p:sp>
+        <p:nvSpPr>
+          <p:cNvPr id="2" name="Espaço Reservado para Imagem do Slide 1"/>
+          <p:cNvSpPr>
+            <a:spLocks noGrp="1" noRot="1" noChangeAspect="1"/>
+          </p:cNvSpPr>
+          <p:nvPr>
+            <p:ph type="sldImg"/>
+          </p:nvPr>
+        </p:nvSpPr>
+        <p:spPr/>
+      </p:sp>
+      <p:sp>
+        <p:nvSpPr>
+          <p:cNvPr id="3" name="Espaço reservado para anotações 2"/>
+          <p:cNvSpPr>
+            <a:spLocks noGrp="1"/>
+          </p:cNvSpPr>
+          <p:nvPr>
+            <p:ph type="body" idx="1"/>
+          </p:nvPr>
+        </p:nvSpPr>
+        <p:spPr/>
+        <p:txBody>
+          <a:bodyPr rtlCol="0"/>
+          <a:lstStyle/>
+          <a:p>
+            <a:pPr rtl="0"/>
+            <a:endParaRPr lang="pt-BR" dirty="0"/>
+          </a:p>
+        </p:txBody>
+      </p:sp>
+      <p:sp>
+        <p:nvSpPr>
+          <p:cNvPr id="4" name="Espaço Reservado para o Número do Slide 3"/>
+          <p:cNvSpPr>
+            <a:spLocks noGrp="1"/>
+          </p:cNvSpPr>
+          <p:nvPr>
+            <p:ph type="sldNum" sz="quarter" idx="5"/>
+          </p:nvPr>
+        </p:nvSpPr>
+        <p:spPr/>
+        <p:txBody>
+          <a:bodyPr rtlCol="0"/>
+          <a:lstStyle/>
+          <a:p>
+            <a:pPr marL="0" marR="0" lvl="0" indent="0" algn="r" defTabSz="914400" rtl="0" eaLnBrk="1" fontAlgn="auto" latinLnBrk="0" hangingPunct="1">
+              <a:lnSpc>
+                <a:spcPct val="100000"/>
+              </a:lnSpc>
+              <a:spcBef>
+                <a:spcPts val="0"/>
+              </a:spcBef>
+              <a:spcAft>
+                <a:spcPts val="0"/>
+              </a:spcAft>
+              <a:buClrTx/>
+              <a:buSzTx/>
+              <a:buFontTx/>
+              <a:buNone/>
+              <a:tabLst/>
+              <a:defRPr/>
+            </a:pPr>
+            <a:fld id="{33AEA074-24A7-4657-AE02-A51F68EA6AA2}" type="slidenum">
+              <a:rPr kumimoji="0" lang="pt-BR" sz="1200" b="0" i="0" u="none" strike="noStrike" kern="1200" cap="none" spc="0" normalizeH="0" baseline="0" smtClean="0">
+                <a:ln>
+                  <a:noFill/>
+                </a:ln>
+                <a:solidFill>
+                  <a:prstClr val="black"/>
+                </a:solidFill>
+                <a:effectLst/>
+                <a:uLnTx/>
+                <a:uFillTx/>
+                <a:latin typeface="Calibri" panose="020F0502020204030204"/>
+                <a:ea typeface="+mn-ea"/>
+                <a:cs typeface="+mn-cs"/>
+              </a:rPr>
+              <a:pPr marL="0" marR="0" lvl="0" indent="0" algn="r" defTabSz="914400" rtl="0" eaLnBrk="1" fontAlgn="auto" latinLnBrk="0" hangingPunct="1">
+                <a:lnSpc>
+                  <a:spcPct val="100000"/>
+                </a:lnSpc>
+                <a:spcBef>
+                  <a:spcPts val="0"/>
+                </a:spcBef>
+                <a:spcAft>
+                  <a:spcPts val="0"/>
+                </a:spcAft>
+                <a:buClrTx/>
+                <a:buSzTx/>
+                <a:buFontTx/>
+                <a:buNone/>
+                <a:tabLst/>
+                <a:defRPr/>
+              </a:pPr>
+              <a:t>12</a:t>
+            </a:fld>
+            <a:endParaRPr kumimoji="0" lang="pt-BR" sz="1200" b="0" i="0" u="none" strike="noStrike" kern="1200" cap="none" spc="0" normalizeH="0" baseline="0" dirty="0">
+              <a:ln>
+                <a:noFill/>
+              </a:ln>
+              <a:solidFill>
+                <a:prstClr val="black"/>
+              </a:solidFill>
+              <a:effectLst/>
+              <a:uLnTx/>
+              <a:uFillTx/>
+              <a:latin typeface="Calibri" panose="020F0502020204030204"/>
+              <a:ea typeface="+mn-ea"/>
+              <a:cs typeface="+mn-cs"/>
+            </a:endParaRPr>
+          </a:p>
+        </p:txBody>
+      </p:sp>
+    </p:spTree>
+    <p:extLst>
+      <p:ext uri="{BB962C8B-B14F-4D97-AF65-F5344CB8AC3E}">
+        <p14:creationId xmlns:p14="http://schemas.microsoft.com/office/powerpoint/2010/main" val="1707429535"/>
+      </p:ext>
+    </p:extLst>
+  </p:cSld>
+  <p:clrMapOvr>
+    <a:masterClrMapping/>
+  </p:clrMapOvr>
+</p:notes>
+</file>
+
+<file path=ppt/notesSlides/notesSlide13.xml><?xml version="1.0" encoding="utf-8"?>
+<p:notes xmlns:a="http://schemas.openxmlformats.org/drawingml/2006/main" xmlns:r="http://schemas.openxmlformats.org/officeDocument/2006/relationships" xmlns:p="http://schemas.openxmlformats.org/presentationml/2006/main">
+  <p:cSld>
+    <p:spTree>
+      <p:nvGrpSpPr>
+        <p:cNvPr id="1" name=""/>
+        <p:cNvGrpSpPr/>
+        <p:nvPr/>
+      </p:nvGrpSpPr>
+      <p:grpSpPr>
+        <a:xfrm>
+          <a:off x="0" y="0"/>
+          <a:ext cx="0" cy="0"/>
+          <a:chOff x="0" y="0"/>
+          <a:chExt cx="0" cy="0"/>
+        </a:xfrm>
+      </p:grpSpPr>
+      <p:sp>
+        <p:nvSpPr>
+          <p:cNvPr id="2" name="Espaço Reservado para Imagem do Slide 1"/>
+          <p:cNvSpPr>
+            <a:spLocks noGrp="1" noRot="1" noChangeAspect="1"/>
+          </p:cNvSpPr>
+          <p:nvPr>
+            <p:ph type="sldImg"/>
+          </p:nvPr>
+        </p:nvSpPr>
+        <p:spPr/>
+      </p:sp>
+      <p:sp>
+        <p:nvSpPr>
+          <p:cNvPr id="3" name="Espaço reservado para anotações 2"/>
+          <p:cNvSpPr>
+            <a:spLocks noGrp="1"/>
+          </p:cNvSpPr>
+          <p:nvPr>
+            <p:ph type="body" idx="1"/>
+          </p:nvPr>
+        </p:nvSpPr>
+        <p:spPr/>
+        <p:txBody>
+          <a:bodyPr rtlCol="0"/>
+          <a:lstStyle/>
+          <a:p>
+            <a:pPr rtl="0"/>
+            <a:endParaRPr lang="pt-BR" dirty="0"/>
+          </a:p>
+        </p:txBody>
+      </p:sp>
+      <p:sp>
+        <p:nvSpPr>
+          <p:cNvPr id="4" name="Espaço Reservado para o Número do Slide 3"/>
+          <p:cNvSpPr>
+            <a:spLocks noGrp="1"/>
+          </p:cNvSpPr>
+          <p:nvPr>
+            <p:ph type="sldNum" sz="quarter" idx="5"/>
+          </p:nvPr>
+        </p:nvSpPr>
+        <p:spPr/>
+        <p:txBody>
+          <a:bodyPr rtlCol="0"/>
+          <a:lstStyle/>
+          <a:p>
+            <a:pPr marL="0" marR="0" lvl="0" indent="0" algn="r" defTabSz="914400" rtl="0" eaLnBrk="1" fontAlgn="auto" latinLnBrk="0" hangingPunct="1">
+              <a:lnSpc>
+                <a:spcPct val="100000"/>
+              </a:lnSpc>
+              <a:spcBef>
+                <a:spcPts val="0"/>
+              </a:spcBef>
+              <a:spcAft>
+                <a:spcPts val="0"/>
+              </a:spcAft>
+              <a:buClrTx/>
+              <a:buSzTx/>
+              <a:buFontTx/>
+              <a:buNone/>
+              <a:tabLst/>
+              <a:defRPr/>
+            </a:pPr>
+            <a:fld id="{33AEA074-24A7-4657-AE02-A51F68EA6AA2}" type="slidenum">
+              <a:rPr kumimoji="0" lang="pt-BR" sz="1200" b="0" i="0" u="none" strike="noStrike" kern="1200" cap="none" spc="0" normalizeH="0" baseline="0" smtClean="0">
+                <a:ln>
+                  <a:noFill/>
+                </a:ln>
+                <a:solidFill>
+                  <a:prstClr val="black"/>
+                </a:solidFill>
+                <a:effectLst/>
+                <a:uLnTx/>
+                <a:uFillTx/>
+                <a:latin typeface="Calibri" panose="020F0502020204030204"/>
+                <a:ea typeface="+mn-ea"/>
+                <a:cs typeface="+mn-cs"/>
+              </a:rPr>
+              <a:pPr marL="0" marR="0" lvl="0" indent="0" algn="r" defTabSz="914400" rtl="0" eaLnBrk="1" fontAlgn="auto" latinLnBrk="0" hangingPunct="1">
+                <a:lnSpc>
+                  <a:spcPct val="100000"/>
+                </a:lnSpc>
+                <a:spcBef>
+                  <a:spcPts val="0"/>
+                </a:spcBef>
+                <a:spcAft>
+                  <a:spcPts val="0"/>
+                </a:spcAft>
+                <a:buClrTx/>
+                <a:buSzTx/>
+                <a:buFontTx/>
+                <a:buNone/>
+                <a:tabLst/>
+                <a:defRPr/>
+              </a:pPr>
+              <a:t>13</a:t>
+            </a:fld>
+            <a:endParaRPr kumimoji="0" lang="pt-BR" sz="1200" b="0" i="0" u="none" strike="noStrike" kern="1200" cap="none" spc="0" normalizeH="0" baseline="0" dirty="0">
+              <a:ln>
+                <a:noFill/>
+              </a:ln>
+              <a:solidFill>
+                <a:prstClr val="black"/>
+              </a:solidFill>
+              <a:effectLst/>
+              <a:uLnTx/>
+              <a:uFillTx/>
+              <a:latin typeface="Calibri" panose="020F0502020204030204"/>
+              <a:ea typeface="+mn-ea"/>
+              <a:cs typeface="+mn-cs"/>
+            </a:endParaRPr>
+          </a:p>
+        </p:txBody>
+      </p:sp>
+    </p:spTree>
+    <p:extLst>
+      <p:ext uri="{BB962C8B-B14F-4D97-AF65-F5344CB8AC3E}">
+        <p14:creationId xmlns:p14="http://schemas.microsoft.com/office/powerpoint/2010/main" val="632457198"/>
+      </p:ext>
+    </p:extLst>
+  </p:cSld>
+  <p:clrMapOvr>
+    <a:masterClrMapping/>
+  </p:clrMapOvr>
+</p:notes>
+</file>
+
 <file path=ppt/notesSlides/notesSlide2.xml><?xml version="1.0" encoding="utf-8"?>
 <p:notes xmlns:a="http://schemas.openxmlformats.org/drawingml/2006/main" xmlns:r="http://schemas.openxmlformats.org/officeDocument/2006/relationships" xmlns:p="http://schemas.openxmlformats.org/presentationml/2006/main">
   <p:cSld>
@@ -1160,7 +1744,7 @@
     </p:spTree>
     <p:extLst>
       <p:ext uri="{BB962C8B-B14F-4D97-AF65-F5344CB8AC3E}">
-        <p14:creationId xmlns:p14="http://schemas.microsoft.com/office/powerpoint/2010/main" val="2629999275"/>
+        <p14:creationId xmlns:p14="http://schemas.microsoft.com/office/powerpoint/2010/main" val="2333981913"/>
       </p:ext>
     </p:extLst>
   </p:cSld>
@@ -1305,7 +1889,7 @@
     </p:spTree>
     <p:extLst>
       <p:ext uri="{BB962C8B-B14F-4D97-AF65-F5344CB8AC3E}">
-        <p14:creationId xmlns:p14="http://schemas.microsoft.com/office/powerpoint/2010/main" val="2864482263"/>
+        <p14:creationId xmlns:p14="http://schemas.microsoft.com/office/powerpoint/2010/main" val="2629999275"/>
       </p:ext>
     </p:extLst>
   </p:cSld>
@@ -1450,7 +2034,7 @@
     </p:spTree>
     <p:extLst>
       <p:ext uri="{BB962C8B-B14F-4D97-AF65-F5344CB8AC3E}">
-        <p14:creationId xmlns:p14="http://schemas.microsoft.com/office/powerpoint/2010/main" val="2333981913"/>
+        <p14:creationId xmlns:p14="http://schemas.microsoft.com/office/powerpoint/2010/main" val="2864482263"/>
       </p:ext>
     </p:extLst>
   </p:cSld>
@@ -3107,7 +3691,7 @@
             <a:pPr rtl="0"/>
             <a:fld id="{76D0790B-18CF-4284-B479-4F95A66DEDDE}" type="datetime1">
               <a:rPr lang="pt-BR" noProof="0" smtClean="0"/>
-              <a:t>10/03/2022</a:t>
+              <a:t>13/03/2022</a:t>
             </a:fld>
             <a:endParaRPr lang="pt-BR" noProof="0" dirty="0"/>
           </a:p>
@@ -3235,6 +3819,9 @@
   <p:clrMapOvr>
     <a:masterClrMapping/>
   </p:clrMapOvr>
+  <p:transition spd="med">
+    <p:pull/>
+  </p:transition>
   <p:hf sldNum="0" hdr="0" ftr="0" dt="0"/>
 </p:sldLayout>
 </file>
@@ -3349,7 +3936,7 @@
             <a:pPr rtl="0"/>
             <a:fld id="{76D0790B-18CF-4284-B479-4F95A66DEDDE}" type="datetime1">
               <a:rPr lang="pt-BR" noProof="0" smtClean="0"/>
-              <a:t>10/03/2022</a:t>
+              <a:t>13/03/2022</a:t>
             </a:fld>
             <a:endParaRPr lang="pt-BR" noProof="0" dirty="0"/>
           </a:p>
@@ -3409,6 +3996,9 @@
   <p:clrMapOvr>
     <a:masterClrMapping/>
   </p:clrMapOvr>
+  <p:transition spd="med">
+    <p:pull/>
+  </p:transition>
   <p:hf sldNum="0" hdr="0" ftr="0" dt="0"/>
 </p:sldLayout>
 </file>
@@ -3533,7 +4123,7 @@
             <a:pPr rtl="0"/>
             <a:fld id="{76D0790B-18CF-4284-B479-4F95A66DEDDE}" type="datetime1">
               <a:rPr lang="pt-BR" noProof="0" smtClean="0"/>
-              <a:t>10/03/2022</a:t>
+              <a:t>13/03/2022</a:t>
             </a:fld>
             <a:endParaRPr lang="pt-BR" noProof="0" dirty="0"/>
           </a:p>
@@ -3593,6 +4183,9 @@
   <p:clrMapOvr>
     <a:masterClrMapping/>
   </p:clrMapOvr>
+  <p:transition spd="med">
+    <p:pull/>
+  </p:transition>
   <p:hf sldNum="0" hdr="0" ftr="0" dt="0"/>
 </p:sldLayout>
 </file>
@@ -3707,7 +4300,7 @@
             <a:pPr rtl="0"/>
             <a:fld id="{76D0790B-18CF-4284-B479-4F95A66DEDDE}" type="datetime1">
               <a:rPr lang="pt-BR" noProof="0" smtClean="0"/>
-              <a:t>10/03/2022</a:t>
+              <a:t>13/03/2022</a:t>
             </a:fld>
             <a:endParaRPr lang="pt-BR" noProof="0" dirty="0"/>
           </a:p>
@@ -3767,6 +4360,9 @@
   <p:clrMapOvr>
     <a:masterClrMapping/>
   </p:clrMapOvr>
+  <p:transition spd="med">
+    <p:pull/>
+  </p:transition>
   <p:hf sldNum="0" hdr="0" ftr="0" dt="0"/>
 </p:sldLayout>
 </file>
@@ -3984,7 +4580,7 @@
             <a:pPr rtl="0"/>
             <a:fld id="{028BC9E8-30A4-4EE6-BB83-B04327D9020A}" type="datetime1">
               <a:rPr lang="pt-BR" noProof="0" smtClean="0"/>
-              <a:t>10/03/2022</a:t>
+              <a:t>13/03/2022</a:t>
             </a:fld>
             <a:endParaRPr lang="pt-BR" noProof="0" dirty="0"/>
           </a:p>
@@ -5014,6 +5610,9 @@
   <p:clrMapOvr>
     <a:overrideClrMapping bg1="dk1" tx1="lt1" bg2="dk2" tx2="lt2" accent1="accent1" accent2="accent2" accent3="accent3" accent4="accent4" accent5="accent5" accent6="accent6" hlink="hlink" folHlink="folHlink"/>
   </p:clrMapOvr>
+  <p:transition spd="med">
+    <p:pull/>
+  </p:transition>
 </p:sldLayout>
 </file>
 
@@ -5189,7 +5788,7 @@
             <a:pPr rtl="0"/>
             <a:fld id="{76D0790B-18CF-4284-B479-4F95A66DEDDE}" type="datetime1">
               <a:rPr lang="pt-BR" noProof="0" smtClean="0"/>
-              <a:t>10/03/2022</a:t>
+              <a:t>13/03/2022</a:t>
             </a:fld>
             <a:endParaRPr lang="pt-BR" noProof="0" dirty="0"/>
           </a:p>
@@ -5249,6 +5848,9 @@
   <p:clrMapOvr>
     <a:masterClrMapping/>
   </p:clrMapOvr>
+  <p:transition spd="med">
+    <p:pull/>
+  </p:transition>
   <p:hf sldNum="0" hdr="0" ftr="0" dt="0"/>
   <p:extLst>
     <p:ext uri="{DCECCB84-F9BA-43D5-87BE-67443E8EF086}">
@@ -5583,7 +6185,7 @@
             <a:pPr rtl="0"/>
             <a:fld id="{76D0790B-18CF-4284-B479-4F95A66DEDDE}" type="datetime1">
               <a:rPr lang="pt-BR" noProof="0" smtClean="0"/>
-              <a:t>10/03/2022</a:t>
+              <a:t>13/03/2022</a:t>
             </a:fld>
             <a:endParaRPr lang="pt-BR" noProof="0" dirty="0"/>
           </a:p>
@@ -5643,6 +6245,9 @@
   <p:clrMapOvr>
     <a:masterClrMapping/>
   </p:clrMapOvr>
+  <p:transition spd="med">
+    <p:pull/>
+  </p:transition>
   <p:hf sldNum="0" hdr="0" ftr="0" dt="0"/>
   <p:extLst>
     <p:ext uri="{DCECCB84-F9BA-43D5-87BE-67443E8EF086}">
@@ -5710,7 +6315,7 @@
             <a:pPr rtl="0"/>
             <a:fld id="{76D0790B-18CF-4284-B479-4F95A66DEDDE}" type="datetime1">
               <a:rPr lang="pt-BR" noProof="0" smtClean="0"/>
-              <a:t>10/03/2022</a:t>
+              <a:t>13/03/2022</a:t>
             </a:fld>
             <a:endParaRPr lang="pt-BR" noProof="0" dirty="0"/>
           </a:p>
@@ -5770,6 +6375,9 @@
   <p:clrMapOvr>
     <a:masterClrMapping/>
   </p:clrMapOvr>
+  <p:transition spd="med">
+    <p:pull/>
+  </p:transition>
   <p:hf sldNum="0" hdr="0" ftr="0" dt="0"/>
 </p:sldLayout>
 </file>
@@ -5809,7 +6417,7 @@
             <a:pPr rtl="0"/>
             <a:fld id="{76D0790B-18CF-4284-B479-4F95A66DEDDE}" type="datetime1">
               <a:rPr lang="pt-BR" noProof="0" smtClean="0"/>
-              <a:t>10/03/2022</a:t>
+              <a:t>13/03/2022</a:t>
             </a:fld>
             <a:endParaRPr lang="pt-BR" noProof="0" dirty="0"/>
           </a:p>
@@ -5869,6 +6477,9 @@
   <p:clrMapOvr>
     <a:masterClrMapping/>
   </p:clrMapOvr>
+  <p:transition spd="med">
+    <p:pull/>
+  </p:transition>
   <p:hf sldNum="0" hdr="0" ftr="0" dt="0"/>
 </p:sldLayout>
 </file>
@@ -6576,7 +7187,7 @@
             <a:pPr rtl="0"/>
             <a:fld id="{76D0790B-18CF-4284-B479-4F95A66DEDDE}" type="datetime1">
               <a:rPr lang="pt-BR" noProof="0" smtClean="0"/>
-              <a:t>10/03/2022</a:t>
+              <a:t>13/03/2022</a:t>
             </a:fld>
             <a:endParaRPr lang="pt-BR" noProof="0" dirty="0"/>
           </a:p>
@@ -6684,6 +7295,9 @@
   <p:clrMapOvr>
     <a:masterClrMapping/>
   </p:clrMapOvr>
+  <p:transition spd="med">
+    <p:pull/>
+  </p:transition>
   <p:hf sldNum="0" hdr="0" ftr="0" dt="0"/>
   <p:extLst>
     <p:ext uri="{DCECCB84-F9BA-43D5-87BE-67443E8EF086}">
@@ -7420,7 +8034,7 @@
             <a:pPr rtl="0"/>
             <a:fld id="{685EFD07-A8B9-401F-868B-7649A9F826C1}" type="datetime1">
               <a:rPr lang="pt-BR" noProof="0" smtClean="0"/>
-              <a:t>10/03/2022</a:t>
+              <a:t>13/03/2022</a:t>
             </a:fld>
             <a:endParaRPr lang="pt-BR" noProof="0" dirty="0"/>
           </a:p>
@@ -7490,6 +8104,9 @@
   <p:clrMapOvr>
     <a:masterClrMapping/>
   </p:clrMapOvr>
+  <p:transition spd="med">
+    <p:pull/>
+  </p:transition>
 </p:sldLayout>
 </file>
 
@@ -7650,7 +8267,7 @@
             <a:pPr rtl="0"/>
             <a:fld id="{76D0790B-18CF-4284-B479-4F95A66DEDDE}" type="datetime1">
               <a:rPr lang="pt-BR" noProof="0" smtClean="0"/>
-              <a:t>10/03/2022</a:t>
+              <a:t>13/03/2022</a:t>
             </a:fld>
             <a:endParaRPr lang="pt-BR" noProof="0" dirty="0"/>
           </a:p>
@@ -8261,6 +8878,9 @@
     <p:sldLayoutId id="2147483915" r:id="rId10"/>
     <p:sldLayoutId id="2147483916" r:id="rId11"/>
   </p:sldLayoutIdLst>
+  <p:transition spd="med">
+    <p:pull/>
+  </p:transition>
   <p:hf sldNum="0" hdr="0" ftr="0" dt="0"/>
   <p:txStyles>
     <p:titleStyle>
@@ -10030,6 +10650,14 @@
   <p:clrMapOvr>
     <a:masterClrMapping/>
   </p:clrMapOvr>
+  <mc:AlternateContent xmlns:mc="http://schemas.openxmlformats.org/markup-compatibility/2006" xmlns:p14="http://schemas.microsoft.com/office/powerpoint/2010/main">
+    <mc:Choice Requires="p14">
+      <p:transition p14:dur="0"/>
+    </mc:Choice>
+    <mc:Fallback xmlns="">
+      <p:transition/>
+    </mc:Fallback>
+  </mc:AlternateContent>
   <p:timing>
     <p:tnLst>
       <p:par>
@@ -10172,6 +10800,522 @@
 </p:sld>
 </file>
 
+<file path=ppt/slides/slide10.xml><?xml version="1.0" encoding="utf-8"?>
+<p:sld xmlns:a="http://schemas.openxmlformats.org/drawingml/2006/main" xmlns:r="http://schemas.openxmlformats.org/officeDocument/2006/relationships" xmlns:p="http://schemas.openxmlformats.org/presentationml/2006/main">
+  <p:cSld>
+    <p:spTree>
+      <p:nvGrpSpPr>
+        <p:cNvPr id="1" name=""/>
+        <p:cNvGrpSpPr/>
+        <p:nvPr/>
+      </p:nvGrpSpPr>
+      <p:grpSpPr>
+        <a:xfrm>
+          <a:off x="0" y="0"/>
+          <a:ext cx="0" cy="0"/>
+          <a:chOff x="0" y="0"/>
+          <a:chExt cx="0" cy="0"/>
+        </a:xfrm>
+      </p:grpSpPr>
+      <p:sp>
+        <p:nvSpPr>
+          <p:cNvPr id="2" name="Título 1">
+            <a:extLst>
+              <a:ext uri="{FF2B5EF4-FFF2-40B4-BE49-F238E27FC236}">
+                <a16:creationId xmlns:a16="http://schemas.microsoft.com/office/drawing/2014/main" id="{89559F60-4CE1-4E2F-86EA-1B60679F1F4A}"/>
+              </a:ext>
+            </a:extLst>
+          </p:cNvPr>
+          <p:cNvSpPr>
+            <a:spLocks noGrp="1"/>
+          </p:cNvSpPr>
+          <p:nvPr>
+            <p:ph type="title"/>
+          </p:nvPr>
+        </p:nvSpPr>
+        <p:spPr>
+          <a:xfrm>
+            <a:off x="3351187" y="2458550"/>
+            <a:ext cx="5489626" cy="970450"/>
+          </a:xfrm>
+        </p:spPr>
+        <p:txBody>
+          <a:bodyPr rtlCol="0" anchor="b">
+            <a:noAutofit/>
+          </a:bodyPr>
+          <a:lstStyle/>
+          <a:p>
+            <a:pPr algn="l"/>
+            <a:r>
+              <a:rPr lang="pt-BR" sz="4000" dirty="0"/>
+              <a:t>Simulador Financeiro</a:t>
+            </a:r>
+          </a:p>
+        </p:txBody>
+      </p:sp>
+      <p:pic>
+        <p:nvPicPr>
+          <p:cNvPr id="5" name="Imagem 4" descr="Desenho preto e branco&#10;&#10;Descrição gerada automaticamente com confiança média">
+            <a:extLst>
+              <a:ext uri="{FF2B5EF4-FFF2-40B4-BE49-F238E27FC236}">
+                <a16:creationId xmlns:a16="http://schemas.microsoft.com/office/drawing/2014/main" id="{589127B4-6815-41FA-BCBE-257F50A61C9D}"/>
+              </a:ext>
+            </a:extLst>
+          </p:cNvPr>
+          <p:cNvPicPr>
+            <a:picLocks noChangeAspect="1"/>
+          </p:cNvPicPr>
+          <p:nvPr/>
+        </p:nvPicPr>
+        <p:blipFill>
+          <a:blip r:embed="rId3"/>
+          <a:stretch>
+            <a:fillRect/>
+          </a:stretch>
+        </p:blipFill>
+        <p:spPr>
+          <a:xfrm>
+            <a:off x="10611083" y="5566409"/>
+            <a:ext cx="1909574" cy="1363981"/>
+          </a:xfrm>
+          <a:prstGeom prst="rect">
+            <a:avLst/>
+          </a:prstGeom>
+        </p:spPr>
+      </p:pic>
+      <p:pic>
+        <p:nvPicPr>
+          <p:cNvPr id="9" name="Imagem 8" descr="Interface gráfica do usuário, Aplicativo&#10;&#10;Descrição gerada automaticamente">
+            <a:extLst>
+              <a:ext uri="{FF2B5EF4-FFF2-40B4-BE49-F238E27FC236}">
+                <a16:creationId xmlns:a16="http://schemas.microsoft.com/office/drawing/2014/main" id="{3194225B-46F9-41F8-8DFC-94B0F653440A}"/>
+              </a:ext>
+            </a:extLst>
+          </p:cNvPr>
+          <p:cNvPicPr>
+            <a:picLocks noChangeAspect="1"/>
+          </p:cNvPicPr>
+          <p:nvPr/>
+        </p:nvPicPr>
+        <p:blipFill>
+          <a:blip r:embed="rId4"/>
+          <a:stretch>
+            <a:fillRect/>
+          </a:stretch>
+        </p:blipFill>
+        <p:spPr>
+          <a:xfrm>
+            <a:off x="6903719" y="3741777"/>
+            <a:ext cx="8490947" cy="4776158"/>
+          </a:xfrm>
+          <a:prstGeom prst="rect">
+            <a:avLst/>
+          </a:prstGeom>
+        </p:spPr>
+      </p:pic>
+    </p:spTree>
+    <p:extLst>
+      <p:ext uri="{BB962C8B-B14F-4D97-AF65-F5344CB8AC3E}">
+        <p14:creationId xmlns:p14="http://schemas.microsoft.com/office/powerpoint/2010/main" val="190208346"/>
+      </p:ext>
+    </p:extLst>
+  </p:cSld>
+  <p:clrMapOvr>
+    <a:masterClrMapping/>
+  </p:clrMapOvr>
+  <p:transition spd="med">
+    <p:pull/>
+  </p:transition>
+</p:sld>
+</file>
+
+<file path=ppt/slides/slide11.xml><?xml version="1.0" encoding="utf-8"?>
+<p:sld xmlns:a="http://schemas.openxmlformats.org/drawingml/2006/main" xmlns:r="http://schemas.openxmlformats.org/officeDocument/2006/relationships" xmlns:p="http://schemas.openxmlformats.org/presentationml/2006/main">
+  <p:cSld>
+    <p:spTree>
+      <p:nvGrpSpPr>
+        <p:cNvPr id="1" name=""/>
+        <p:cNvGrpSpPr/>
+        <p:nvPr/>
+      </p:nvGrpSpPr>
+      <p:grpSpPr>
+        <a:xfrm>
+          <a:off x="0" y="0"/>
+          <a:ext cx="0" cy="0"/>
+          <a:chOff x="0" y="0"/>
+          <a:chExt cx="0" cy="0"/>
+        </a:xfrm>
+      </p:grpSpPr>
+      <p:sp>
+        <p:nvSpPr>
+          <p:cNvPr id="2" name="Título 1">
+            <a:extLst>
+              <a:ext uri="{FF2B5EF4-FFF2-40B4-BE49-F238E27FC236}">
+                <a16:creationId xmlns:a16="http://schemas.microsoft.com/office/drawing/2014/main" id="{89559F60-4CE1-4E2F-86EA-1B60679F1F4A}"/>
+              </a:ext>
+            </a:extLst>
+          </p:cNvPr>
+          <p:cNvSpPr>
+            <a:spLocks noGrp="1"/>
+          </p:cNvSpPr>
+          <p:nvPr>
+            <p:ph type="title"/>
+          </p:nvPr>
+        </p:nvSpPr>
+        <p:spPr>
+          <a:xfrm>
+            <a:off x="3351187" y="2458550"/>
+            <a:ext cx="5489626" cy="970450"/>
+          </a:xfrm>
+        </p:spPr>
+        <p:txBody>
+          <a:bodyPr rtlCol="0" anchor="b">
+            <a:noAutofit/>
+          </a:bodyPr>
+          <a:lstStyle/>
+          <a:p>
+            <a:pPr algn="l"/>
+            <a:r>
+              <a:rPr lang="pt-BR" sz="4000" dirty="0"/>
+              <a:t>Tabelas do projeto</a:t>
+            </a:r>
+          </a:p>
+        </p:txBody>
+      </p:sp>
+      <p:pic>
+        <p:nvPicPr>
+          <p:cNvPr id="5" name="Imagem 4" descr="Desenho preto e branco&#10;&#10;Descrição gerada automaticamente com confiança média">
+            <a:extLst>
+              <a:ext uri="{FF2B5EF4-FFF2-40B4-BE49-F238E27FC236}">
+                <a16:creationId xmlns:a16="http://schemas.microsoft.com/office/drawing/2014/main" id="{589127B4-6815-41FA-BCBE-257F50A61C9D}"/>
+              </a:ext>
+            </a:extLst>
+          </p:cNvPr>
+          <p:cNvPicPr>
+            <a:picLocks noChangeAspect="1"/>
+          </p:cNvPicPr>
+          <p:nvPr/>
+        </p:nvPicPr>
+        <p:blipFill>
+          <a:blip r:embed="rId3"/>
+          <a:stretch>
+            <a:fillRect/>
+          </a:stretch>
+        </p:blipFill>
+        <p:spPr>
+          <a:xfrm>
+            <a:off x="10611083" y="5566409"/>
+            <a:ext cx="1909574" cy="1363981"/>
+          </a:xfrm>
+          <a:prstGeom prst="rect">
+            <a:avLst/>
+          </a:prstGeom>
+        </p:spPr>
+      </p:pic>
+      <p:pic>
+        <p:nvPicPr>
+          <p:cNvPr id="9" name="Imagem 8" descr="Interface gráfica do usuário, Aplicativo&#10;&#10;Descrição gerada automaticamente">
+            <a:extLst>
+              <a:ext uri="{FF2B5EF4-FFF2-40B4-BE49-F238E27FC236}">
+                <a16:creationId xmlns:a16="http://schemas.microsoft.com/office/drawing/2014/main" id="{3194225B-46F9-41F8-8DFC-94B0F653440A}"/>
+              </a:ext>
+            </a:extLst>
+          </p:cNvPr>
+          <p:cNvPicPr>
+            <a:picLocks noChangeAspect="1"/>
+          </p:cNvPicPr>
+          <p:nvPr/>
+        </p:nvPicPr>
+        <p:blipFill>
+          <a:blip r:embed="rId4"/>
+          <a:stretch>
+            <a:fillRect/>
+          </a:stretch>
+        </p:blipFill>
+        <p:spPr>
+          <a:xfrm>
+            <a:off x="6903719" y="3741777"/>
+            <a:ext cx="8490947" cy="4776158"/>
+          </a:xfrm>
+          <a:prstGeom prst="rect">
+            <a:avLst/>
+          </a:prstGeom>
+        </p:spPr>
+      </p:pic>
+    </p:spTree>
+    <p:extLst>
+      <p:ext uri="{BB962C8B-B14F-4D97-AF65-F5344CB8AC3E}">
+        <p14:creationId xmlns:p14="http://schemas.microsoft.com/office/powerpoint/2010/main" val="247055207"/>
+      </p:ext>
+    </p:extLst>
+  </p:cSld>
+  <p:clrMapOvr>
+    <a:masterClrMapping/>
+  </p:clrMapOvr>
+  <p:transition spd="med">
+    <p:pull/>
+  </p:transition>
+</p:sld>
+</file>
+
+<file path=ppt/slides/slide12.xml><?xml version="1.0" encoding="utf-8"?>
+<p:sld xmlns:a="http://schemas.openxmlformats.org/drawingml/2006/main" xmlns:r="http://schemas.openxmlformats.org/officeDocument/2006/relationships" xmlns:p="http://schemas.openxmlformats.org/presentationml/2006/main">
+  <p:cSld>
+    <p:spTree>
+      <p:nvGrpSpPr>
+        <p:cNvPr id="1" name=""/>
+        <p:cNvGrpSpPr/>
+        <p:nvPr/>
+      </p:nvGrpSpPr>
+      <p:grpSpPr>
+        <a:xfrm>
+          <a:off x="0" y="0"/>
+          <a:ext cx="0" cy="0"/>
+          <a:chOff x="0" y="0"/>
+          <a:chExt cx="0" cy="0"/>
+        </a:xfrm>
+      </p:grpSpPr>
+      <p:sp>
+        <p:nvSpPr>
+          <p:cNvPr id="2" name="Título 1">
+            <a:extLst>
+              <a:ext uri="{FF2B5EF4-FFF2-40B4-BE49-F238E27FC236}">
+                <a16:creationId xmlns:a16="http://schemas.microsoft.com/office/drawing/2014/main" id="{89559F60-4CE1-4E2F-86EA-1B60679F1F4A}"/>
+              </a:ext>
+            </a:extLst>
+          </p:cNvPr>
+          <p:cNvSpPr>
+            <a:spLocks noGrp="1"/>
+          </p:cNvSpPr>
+          <p:nvPr>
+            <p:ph type="title"/>
+          </p:nvPr>
+        </p:nvSpPr>
+        <p:spPr>
+          <a:xfrm>
+            <a:off x="1277458" y="2943775"/>
+            <a:ext cx="5489626" cy="970450"/>
+          </a:xfrm>
+        </p:spPr>
+        <p:txBody>
+          <a:bodyPr rtlCol="0" anchor="b">
+            <a:noAutofit/>
+          </a:bodyPr>
+          <a:lstStyle/>
+          <a:p>
+            <a:pPr algn="l"/>
+            <a:r>
+              <a:rPr lang="pt-BR" sz="6000" dirty="0"/>
+              <a:t>Obrigado!</a:t>
+            </a:r>
+          </a:p>
+        </p:txBody>
+      </p:sp>
+      <p:pic>
+        <p:nvPicPr>
+          <p:cNvPr id="5" name="Imagem 4" descr="Desenho preto e branco&#10;&#10;Descrição gerada automaticamente com confiança média">
+            <a:extLst>
+              <a:ext uri="{FF2B5EF4-FFF2-40B4-BE49-F238E27FC236}">
+                <a16:creationId xmlns:a16="http://schemas.microsoft.com/office/drawing/2014/main" id="{589127B4-6815-41FA-BCBE-257F50A61C9D}"/>
+              </a:ext>
+            </a:extLst>
+          </p:cNvPr>
+          <p:cNvPicPr>
+            <a:picLocks noChangeAspect="1"/>
+          </p:cNvPicPr>
+          <p:nvPr/>
+        </p:nvPicPr>
+        <p:blipFill>
+          <a:blip r:embed="rId3"/>
+          <a:stretch>
+            <a:fillRect/>
+          </a:stretch>
+        </p:blipFill>
+        <p:spPr>
+          <a:xfrm>
+            <a:off x="10611083" y="5566409"/>
+            <a:ext cx="1909574" cy="1363981"/>
+          </a:xfrm>
+          <a:prstGeom prst="rect">
+            <a:avLst/>
+          </a:prstGeom>
+        </p:spPr>
+      </p:pic>
+      <p:pic>
+        <p:nvPicPr>
+          <p:cNvPr id="9" name="Imagem 8" descr="Interface gráfica do usuário, Aplicativo&#10;&#10;Descrição gerada automaticamente">
+            <a:extLst>
+              <a:ext uri="{FF2B5EF4-FFF2-40B4-BE49-F238E27FC236}">
+                <a16:creationId xmlns:a16="http://schemas.microsoft.com/office/drawing/2014/main" id="{3194225B-46F9-41F8-8DFC-94B0F653440A}"/>
+              </a:ext>
+            </a:extLst>
+          </p:cNvPr>
+          <p:cNvPicPr>
+            <a:picLocks noChangeAspect="1"/>
+          </p:cNvPicPr>
+          <p:nvPr/>
+        </p:nvPicPr>
+        <p:blipFill>
+          <a:blip r:embed="rId4"/>
+          <a:stretch>
+            <a:fillRect/>
+          </a:stretch>
+        </p:blipFill>
+        <p:spPr>
+          <a:xfrm>
+            <a:off x="6903719" y="3741777"/>
+            <a:ext cx="8490947" cy="4776158"/>
+          </a:xfrm>
+          <a:prstGeom prst="rect">
+            <a:avLst/>
+          </a:prstGeom>
+        </p:spPr>
+      </p:pic>
+    </p:spTree>
+    <p:extLst>
+      <p:ext uri="{BB962C8B-B14F-4D97-AF65-F5344CB8AC3E}">
+        <p14:creationId xmlns:p14="http://schemas.microsoft.com/office/powerpoint/2010/main" val="334243877"/>
+      </p:ext>
+    </p:extLst>
+  </p:cSld>
+  <p:clrMapOvr>
+    <a:masterClrMapping/>
+  </p:clrMapOvr>
+  <p:transition spd="med">
+    <p:pull/>
+  </p:transition>
+</p:sld>
+</file>
+
+<file path=ppt/slides/slide13.xml><?xml version="1.0" encoding="utf-8"?>
+<p:sld xmlns:a="http://schemas.openxmlformats.org/drawingml/2006/main" xmlns:r="http://schemas.openxmlformats.org/officeDocument/2006/relationships" xmlns:p="http://schemas.openxmlformats.org/presentationml/2006/main">
+  <p:cSld>
+    <p:spTree>
+      <p:nvGrpSpPr>
+        <p:cNvPr id="1" name=""/>
+        <p:cNvGrpSpPr/>
+        <p:nvPr/>
+      </p:nvGrpSpPr>
+      <p:grpSpPr>
+        <a:xfrm>
+          <a:off x="0" y="0"/>
+          <a:ext cx="0" cy="0"/>
+          <a:chOff x="0" y="0"/>
+          <a:chExt cx="0" cy="0"/>
+        </a:xfrm>
+      </p:grpSpPr>
+      <p:sp>
+        <p:nvSpPr>
+          <p:cNvPr id="2" name="Título 1">
+            <a:extLst>
+              <a:ext uri="{FF2B5EF4-FFF2-40B4-BE49-F238E27FC236}">
+                <a16:creationId xmlns:a16="http://schemas.microsoft.com/office/drawing/2014/main" id="{89559F60-4CE1-4E2F-86EA-1B60679F1F4A}"/>
+              </a:ext>
+            </a:extLst>
+          </p:cNvPr>
+          <p:cNvSpPr>
+            <a:spLocks noGrp="1"/>
+          </p:cNvSpPr>
+          <p:nvPr>
+            <p:ph type="title"/>
+          </p:nvPr>
+        </p:nvSpPr>
+        <p:spPr>
+          <a:xfrm>
+            <a:off x="1057021" y="3741777"/>
+            <a:ext cx="6511271" cy="970450"/>
+          </a:xfrm>
+        </p:spPr>
+        <p:txBody>
+          <a:bodyPr rtlCol="0" anchor="b">
+            <a:noAutofit/>
+          </a:bodyPr>
+          <a:lstStyle/>
+          <a:p>
+            <a:pPr algn="l"/>
+            <a:r>
+              <a:rPr lang="pt-BR" sz="4000" dirty="0"/>
+              <a:t>Gostaríamos de dedicar esse trabalho ao nosso companheiro João Henrique (paizão)</a:t>
+            </a:r>
+          </a:p>
+        </p:txBody>
+      </p:sp>
+      <p:pic>
+        <p:nvPicPr>
+          <p:cNvPr id="5" name="Imagem 4" descr="Desenho preto e branco&#10;&#10;Descrição gerada automaticamente com confiança média">
+            <a:extLst>
+              <a:ext uri="{FF2B5EF4-FFF2-40B4-BE49-F238E27FC236}">
+                <a16:creationId xmlns:a16="http://schemas.microsoft.com/office/drawing/2014/main" id="{589127B4-6815-41FA-BCBE-257F50A61C9D}"/>
+              </a:ext>
+            </a:extLst>
+          </p:cNvPr>
+          <p:cNvPicPr>
+            <a:picLocks noChangeAspect="1"/>
+          </p:cNvPicPr>
+          <p:nvPr/>
+        </p:nvPicPr>
+        <p:blipFill>
+          <a:blip r:embed="rId3"/>
+          <a:stretch>
+            <a:fillRect/>
+          </a:stretch>
+        </p:blipFill>
+        <p:spPr>
+          <a:xfrm>
+            <a:off x="10611083" y="5566409"/>
+            <a:ext cx="1909574" cy="1363981"/>
+          </a:xfrm>
+          <a:prstGeom prst="rect">
+            <a:avLst/>
+          </a:prstGeom>
+        </p:spPr>
+      </p:pic>
+      <p:pic>
+        <p:nvPicPr>
+          <p:cNvPr id="9" name="Imagem 8" descr="Interface gráfica do usuário, Aplicativo&#10;&#10;Descrição gerada automaticamente">
+            <a:extLst>
+              <a:ext uri="{FF2B5EF4-FFF2-40B4-BE49-F238E27FC236}">
+                <a16:creationId xmlns:a16="http://schemas.microsoft.com/office/drawing/2014/main" id="{3194225B-46F9-41F8-8DFC-94B0F653440A}"/>
+              </a:ext>
+            </a:extLst>
+          </p:cNvPr>
+          <p:cNvPicPr>
+            <a:picLocks noChangeAspect="1"/>
+          </p:cNvPicPr>
+          <p:nvPr/>
+        </p:nvPicPr>
+        <p:blipFill>
+          <a:blip r:embed="rId4"/>
+          <a:stretch>
+            <a:fillRect/>
+          </a:stretch>
+        </p:blipFill>
+        <p:spPr>
+          <a:xfrm>
+            <a:off x="6903719" y="3741777"/>
+            <a:ext cx="8490947" cy="4776158"/>
+          </a:xfrm>
+          <a:prstGeom prst="rect">
+            <a:avLst/>
+          </a:prstGeom>
+        </p:spPr>
+      </p:pic>
+    </p:spTree>
+    <p:extLst>
+      <p:ext uri="{BB962C8B-B14F-4D97-AF65-F5344CB8AC3E}">
+        <p14:creationId xmlns:p14="http://schemas.microsoft.com/office/powerpoint/2010/main" val="472915039"/>
+      </p:ext>
+    </p:extLst>
+  </p:cSld>
+  <p:clrMapOvr>
+    <a:masterClrMapping/>
+  </p:clrMapOvr>
+  <p:transition spd="med">
+    <p:pull/>
+  </p:transition>
+</p:sld>
+</file>
+
 <file path=ppt/slides/slide2.xml><?xml version="1.0" encoding="utf-8"?>
 <p:sld xmlns:a="http://schemas.openxmlformats.org/drawingml/2006/main" xmlns:r="http://schemas.openxmlformats.org/officeDocument/2006/relationships" xmlns:p="http://schemas.openxmlformats.org/presentationml/2006/main">
   <p:cSld>
@@ -10227,27 +11371,19 @@
         <p:spPr>
           <a:xfrm>
             <a:off x="1414093" y="609601"/>
-            <a:ext cx="4538124" cy="970450"/>
+            <a:ext cx="5427578" cy="970450"/>
           </a:xfrm>
         </p:spPr>
         <p:txBody>
           <a:bodyPr rtlCol="0" anchor="b">
-            <a:normAutofit fontScale="90000"/>
+            <a:normAutofit/>
           </a:bodyPr>
           <a:lstStyle/>
           <a:p>
             <a:pPr algn="l"/>
             <a:r>
               <a:rPr lang="pt-BR" sz="4000" dirty="0"/>
-              <a:t>Título </a:t>
-            </a:r>
-            <a:r>
-              <a:rPr lang="pt-BR" sz="4000" dirty="0" err="1"/>
-              <a:t>Lorem</a:t>
-            </a:r>
-            <a:r>
-              <a:rPr lang="pt-BR" sz="4000" dirty="0"/>
-              <a:t> Ipsum	</a:t>
+              <a:t>Integrantes</a:t>
             </a:r>
           </a:p>
         </p:txBody>
@@ -10270,7 +11406,7 @@
         </p:nvSpPr>
         <p:spPr>
           <a:xfrm>
-            <a:off x="1414093" y="2189648"/>
+            <a:off x="1242643" y="2352933"/>
             <a:ext cx="4403596" cy="4058751"/>
           </a:xfrm>
         </p:spPr>
@@ -10284,42 +11420,12 @@
               <a:buNone/>
             </a:pPr>
             <a:r>
-              <a:rPr lang="pt-BR" sz="2400" dirty="0" err="1"/>
-              <a:t>Dolor</a:t>
-            </a:r>
-            <a:r>
               <a:rPr lang="pt-BR" sz="2400" dirty="0"/>
-              <a:t> </a:t>
+              <a:t>Arthur </a:t>
             </a:r>
             <a:r>
               <a:rPr lang="pt-BR" sz="2400" dirty="0" err="1"/>
-              <a:t>Sit</a:t>
-            </a:r>
-            <a:r>
-              <a:rPr lang="pt-BR" sz="2400" dirty="0"/>
-              <a:t> </a:t>
-            </a:r>
-            <a:r>
-              <a:rPr lang="pt-BR" sz="2400" dirty="0" err="1"/>
-              <a:t>Amet</a:t>
-            </a:r>
-            <a:endParaRPr lang="pt-BR" sz="2400" dirty="0"/>
-          </a:p>
-          <a:p>
-            <a:pPr marL="36900" lvl="0" indent="0" rtl="0">
-              <a:buNone/>
-            </a:pPr>
-            <a:r>
-              <a:rPr lang="pt-BR" sz="2400" dirty="0" err="1"/>
-              <a:t>Consectetuer</a:t>
-            </a:r>
-            <a:r>
-              <a:rPr lang="pt-BR" sz="2400" dirty="0"/>
-              <a:t> </a:t>
-            </a:r>
-            <a:r>
-              <a:rPr lang="pt-BR" sz="2400" dirty="0" err="1"/>
-              <a:t>Elit</a:t>
+              <a:t>Peraçolli</a:t>
             </a:r>
             <a:endParaRPr lang="pt-BR" sz="2400" dirty="0"/>
           </a:p>
@@ -10329,44 +11435,63 @@
             </a:pPr>
             <a:r>
               <a:rPr lang="pt-BR" sz="2400" dirty="0"/>
-              <a:t>Nunc </a:t>
+              <a:t>Caique Carvalho</a:t>
             </a:r>
-            <a:r>
-              <a:rPr lang="pt-BR" sz="2400" dirty="0" err="1"/>
-              <a:t>Viverra</a:t>
-            </a:r>
-            <a:endParaRPr lang="pt-BR" sz="2400" dirty="0"/>
           </a:p>
           <a:p>
             <a:pPr marL="36900" lvl="0" indent="0" rtl="0">
               <a:buNone/>
             </a:pPr>
             <a:r>
-              <a:rPr lang="pt-BR" sz="2400" dirty="0" err="1"/>
-              <a:t>Pellentesque</a:t>
+              <a:rPr lang="pt-BR" sz="2400" dirty="0"/>
+              <a:t>Gabriel Martins</a:t>
             </a:r>
-            <a:r>
-              <a:rPr lang="pt-BR" sz="2400" dirty="0"/>
-              <a:t> </a:t>
-            </a:r>
-            <a:r>
-              <a:rPr lang="pt-BR" sz="2400" dirty="0" err="1"/>
-              <a:t>Habitant</a:t>
-            </a:r>
-            <a:endParaRPr lang="pt-BR" sz="2400" dirty="0"/>
           </a:p>
           <a:p>
             <a:pPr marL="36900" lvl="0" indent="0" rtl="0">
               <a:buNone/>
             </a:pPr>
             <a:r>
-              <a:rPr lang="pt-BR" sz="2400" dirty="0" err="1"/>
-              <a:t>Lorem</a:t>
+              <a:rPr lang="pt-BR" sz="2400" dirty="0"/>
+              <a:t>Guilherme </a:t>
             </a:r>
             <a:r>
+              <a:rPr lang="pt-BR" sz="2400" dirty="0" err="1"/>
+              <a:t>Benassi</a:t>
+            </a:r>
+            <a:endParaRPr lang="pt-BR" sz="2400" dirty="0"/>
+          </a:p>
+          <a:p>
+            <a:pPr marL="36900" lvl="0" indent="0" rtl="0">
+              <a:buNone/>
+            </a:pPr>
+            <a:r>
               <a:rPr lang="pt-BR" sz="2400" dirty="0"/>
-              <a:t> Ipsum</a:t>
+              <a:t>Guilherme Gonçalves</a:t>
             </a:r>
+          </a:p>
+          <a:p>
+            <a:pPr marL="36900" lvl="0" indent="0" rtl="0">
+              <a:buNone/>
+            </a:pPr>
+            <a:r>
+              <a:rPr lang="pt-BR" sz="2400" dirty="0"/>
+              <a:t>João Henrique </a:t>
+            </a:r>
+          </a:p>
+          <a:p>
+            <a:pPr marL="36900" lvl="0" indent="0" rtl="0">
+              <a:buNone/>
+            </a:pPr>
+            <a:r>
+              <a:rPr lang="pt-BR" sz="2400" dirty="0"/>
+              <a:t>Yuri </a:t>
+            </a:r>
+            <a:r>
+              <a:rPr lang="pt-BR" sz="2400" dirty="0" err="1"/>
+              <a:t>Carralero</a:t>
+            </a:r>
+            <a:endParaRPr lang="pt-BR" sz="2400" dirty="0"/>
           </a:p>
           <a:p>
             <a:pPr rtl="0"/>
@@ -10444,6 +11569,18 @@
   <p:clrMapOvr>
     <a:masterClrMapping/>
   </p:clrMapOvr>
+  <mc:AlternateContent xmlns:mc="http://schemas.openxmlformats.org/markup-compatibility/2006" xmlns:p159="http://schemas.microsoft.com/office/powerpoint/2015/09/main">
+    <mc:Choice Requires="p159">
+      <p:transition xmlns:p14="http://schemas.microsoft.com/office/powerpoint/2010/main" spd="slow" p14:dur="2000">
+        <p159:morph option="byObject"/>
+      </p:transition>
+    </mc:Choice>
+    <mc:Fallback xmlns="">
+      <p:transition spd="slow">
+        <p:fade/>
+      </p:transition>
+    </mc:Fallback>
+  </mc:AlternateContent>
 </p:sld>
 </file>
 
@@ -10482,8 +11619,8 @@
         </p:nvSpPr>
         <p:spPr>
           <a:xfrm>
-            <a:off x="1414093" y="609601"/>
-            <a:ext cx="4538124" cy="970450"/>
+            <a:off x="1324283" y="792107"/>
+            <a:ext cx="9286800" cy="1091284"/>
           </a:xfrm>
         </p:spPr>
         <p:txBody>
@@ -10492,18 +11629,9 @@
           </a:bodyPr>
           <a:lstStyle/>
           <a:p>
-            <a:pPr algn="l"/>
             <a:r>
               <a:rPr lang="pt-BR" sz="4000" dirty="0"/>
-              <a:t>Título </a:t>
-            </a:r>
-            <a:r>
-              <a:rPr lang="pt-BR" sz="4000" dirty="0" err="1"/>
-              <a:t>Lorem</a:t>
-            </a:r>
-            <a:r>
-              <a:rPr lang="pt-BR" sz="4000" dirty="0"/>
-              <a:t> Ipsum	</a:t>
+              <a:t>Sistema de monitoramento de tráfego interno de pessoas em shoppings</a:t>
             </a:r>
           </a:p>
         </p:txBody>
@@ -10526,8 +11654,8 @@
         </p:nvSpPr>
         <p:spPr>
           <a:xfrm>
-            <a:off x="1414093" y="2189648"/>
-            <a:ext cx="4403596" cy="4058751"/>
+            <a:off x="1414092" y="2189648"/>
+            <a:ext cx="8490947" cy="4058751"/>
           </a:xfrm>
         </p:spPr>
         <p:txBody>
@@ -10536,96 +11664,36 @@
           </a:bodyPr>
           <a:lstStyle/>
           <a:p>
-            <a:pPr marL="36900" lvl="0" indent="0" rtl="0">
+            <a:pPr algn="l">
+              <a:buFont typeface="Wingdings" panose="05000000000000000000" pitchFamily="2" charset="2"/>
+              <a:buChar char="q"/>
+            </a:pPr>
+            <a:r>
+              <a:rPr lang="pt-BR" sz="2000" dirty="0">
+                <a:latin typeface="Arial" panose="020B0604020202020204" pitchFamily="34" charset="0"/>
+              </a:rPr>
+              <a:t>A Light </a:t>
+            </a:r>
+            <a:r>
+              <a:rPr lang="pt-BR" sz="2000" dirty="0" err="1">
+                <a:latin typeface="Arial" panose="020B0604020202020204" pitchFamily="34" charset="0"/>
+              </a:rPr>
+              <a:t>On</a:t>
+            </a:r>
+            <a:r>
+              <a:rPr lang="pt-BR" sz="2000" dirty="0">
+                <a:latin typeface="Arial" panose="020B0604020202020204" pitchFamily="34" charset="0"/>
+              </a:rPr>
+              <a:t> é uma empresa de software que promove aos shoppings uma melhor forma de gerenciar seu espaço para alocação de marketing.</a:t>
+            </a:r>
+          </a:p>
+          <a:p>
+            <a:pPr marL="0" indent="0">
               <a:buNone/>
             </a:pPr>
-            <a:r>
-              <a:rPr lang="pt-BR" sz="2400" dirty="0" err="1"/>
-              <a:t>Dolor</a:t>
-            </a:r>
-            <a:r>
-              <a:rPr lang="pt-BR" sz="2400" dirty="0"/>
-              <a:t> </a:t>
-            </a:r>
-            <a:r>
-              <a:rPr lang="pt-BR" sz="2400" dirty="0" err="1"/>
-              <a:t>Sit</a:t>
-            </a:r>
-            <a:r>
-              <a:rPr lang="pt-BR" sz="2400" dirty="0"/>
-              <a:t> </a:t>
-            </a:r>
-            <a:r>
-              <a:rPr lang="pt-BR" sz="2400" dirty="0" err="1"/>
-              <a:t>Amet</a:t>
-            </a:r>
-            <a:endParaRPr lang="pt-BR" sz="2400" dirty="0"/>
-          </a:p>
-          <a:p>
-            <a:pPr marL="36900" lvl="0" indent="0" rtl="0">
-              <a:buNone/>
-            </a:pPr>
-            <a:r>
-              <a:rPr lang="pt-BR" sz="2400" dirty="0" err="1"/>
-              <a:t>Consectetuer</a:t>
-            </a:r>
-            <a:r>
-              <a:rPr lang="pt-BR" sz="2400" dirty="0"/>
-              <a:t> </a:t>
-            </a:r>
-            <a:r>
-              <a:rPr lang="pt-BR" sz="2400" dirty="0" err="1"/>
-              <a:t>Elit</a:t>
-            </a:r>
-            <a:endParaRPr lang="pt-BR" sz="2400" dirty="0"/>
-          </a:p>
-          <a:p>
-            <a:pPr marL="36900" lvl="0" indent="0" rtl="0">
-              <a:buNone/>
-            </a:pPr>
-            <a:r>
-              <a:rPr lang="pt-BR" sz="2400" dirty="0"/>
-              <a:t>Nunc </a:t>
-            </a:r>
-            <a:r>
-              <a:rPr lang="pt-BR" sz="2400" dirty="0" err="1"/>
-              <a:t>Viverra</a:t>
-            </a:r>
-            <a:endParaRPr lang="pt-BR" sz="2400" dirty="0"/>
-          </a:p>
-          <a:p>
-            <a:pPr marL="36900" lvl="0" indent="0" rtl="0">
-              <a:buNone/>
-            </a:pPr>
-            <a:r>
-              <a:rPr lang="pt-BR" sz="2400" dirty="0" err="1"/>
-              <a:t>Pellentesque</a:t>
-            </a:r>
-            <a:r>
-              <a:rPr lang="pt-BR" sz="2400" dirty="0"/>
-              <a:t> </a:t>
-            </a:r>
-            <a:r>
-              <a:rPr lang="pt-BR" sz="2400" dirty="0" err="1"/>
-              <a:t>Habitant</a:t>
-            </a:r>
-            <a:endParaRPr lang="pt-BR" sz="2400" dirty="0"/>
-          </a:p>
-          <a:p>
-            <a:pPr marL="36900" lvl="0" indent="0" rtl="0">
-              <a:buNone/>
-            </a:pPr>
-            <a:r>
-              <a:rPr lang="pt-BR" sz="2400" dirty="0" err="1"/>
-              <a:t>Lorem</a:t>
-            </a:r>
-            <a:r>
-              <a:rPr lang="pt-BR" sz="2400" dirty="0"/>
-              <a:t> Ipsum</a:t>
-            </a:r>
-          </a:p>
-          <a:p>
-            <a:pPr rtl="0"/>
+            <a:br>
+              <a:rPr lang="pt-BR" sz="2000" dirty="0"/>
+            </a:br>
             <a:endParaRPr lang="pt-BR" sz="2400" dirty="0"/>
           </a:p>
         </p:txBody>
@@ -10700,6 +11768,9 @@
   <p:clrMapOvr>
     <a:masterClrMapping/>
   </p:clrMapOvr>
+  <p:transition spd="med">
+    <p:pull/>
+  </p:transition>
 </p:sld>
 </file>
 
@@ -10744,22 +11815,14 @@
         </p:spPr>
         <p:txBody>
           <a:bodyPr rtlCol="0" anchor="b">
-            <a:normAutofit fontScale="90000"/>
+            <a:normAutofit/>
           </a:bodyPr>
           <a:lstStyle/>
           <a:p>
             <a:pPr algn="l"/>
             <a:r>
               <a:rPr lang="pt-BR" sz="4000" dirty="0"/>
-              <a:t>Título </a:t>
-            </a:r>
-            <a:r>
-              <a:rPr lang="pt-BR" sz="4000" dirty="0" err="1"/>
-              <a:t>Lorem</a:t>
-            </a:r>
-            <a:r>
-              <a:rPr lang="pt-BR" sz="4000" dirty="0"/>
-              <a:t> Ipsum	</a:t>
+              <a:t>Contexto</a:t>
             </a:r>
           </a:p>
         </p:txBody>
@@ -10782,107 +11845,38 @@
         </p:nvSpPr>
         <p:spPr>
           <a:xfrm>
-            <a:off x="1414093" y="2189648"/>
+            <a:off x="1152836" y="1925669"/>
             <a:ext cx="4403596" cy="4058751"/>
           </a:xfrm>
         </p:spPr>
         <p:txBody>
           <a:bodyPr rtlCol="0" anchor="t">
-            <a:normAutofit/>
+            <a:normAutofit fontScale="25000" lnSpcReduction="20000"/>
           </a:bodyPr>
           <a:lstStyle/>
           <a:p>
             <a:pPr marL="36900" lvl="0" indent="0" rtl="0">
               <a:buNone/>
             </a:pPr>
-            <a:r>
-              <a:rPr lang="pt-BR" sz="2400" dirty="0" err="1"/>
-              <a:t>Dolor</a:t>
-            </a:r>
-            <a:r>
-              <a:rPr lang="pt-BR" sz="2400" dirty="0"/>
-              <a:t> </a:t>
-            </a:r>
-            <a:r>
-              <a:rPr lang="pt-BR" sz="2400" dirty="0" err="1"/>
-              <a:t>Sit</a:t>
-            </a:r>
-            <a:r>
-              <a:rPr lang="pt-BR" sz="2400" dirty="0"/>
-              <a:t> </a:t>
-            </a:r>
-            <a:r>
-              <a:rPr lang="pt-BR" sz="2400" dirty="0" err="1"/>
-              <a:t>Amet</a:t>
-            </a:r>
             <a:endParaRPr lang="pt-BR" sz="2400" dirty="0"/>
           </a:p>
           <a:p>
-            <a:pPr marL="36900" lvl="0" indent="0" rtl="0">
-              <a:buNone/>
+            <a:pPr>
+              <a:lnSpc>
+                <a:spcPct val="125000"/>
+              </a:lnSpc>
+              <a:spcAft>
+                <a:spcPts val="800"/>
+              </a:spcAft>
+              <a:buFont typeface="Wingdings" panose="05000000000000000000" pitchFamily="2" charset="2"/>
+              <a:buChar char="q"/>
             </a:pPr>
             <a:r>
-              <a:rPr lang="pt-BR" sz="2400" dirty="0" err="1"/>
-              <a:t>Consectetuer</a:t>
+              <a:rPr lang="pt-BR" sz="8000" dirty="0">
+                <a:latin typeface="Arial" panose="020B0604020202020204" pitchFamily="34" charset="0"/>
+              </a:rPr>
+              <a:t>Desde sempre, a humanidade muda tudo que pode, quantas vezes puder de forma a garantir melhores resultados, com os complexos comerciais, shoppings, feiras fechadas ou qualquer outro modelo de negócio do ramo sofrendo com o passar do tempo, devemos adequá-los ao novo mundo que vivemos, além de aproveitar o “boom” pós pandemia para maximizar os ganhos e potencializar o negócio.</a:t>
             </a:r>
-            <a:r>
-              <a:rPr lang="pt-BR" sz="2400" dirty="0"/>
-              <a:t> </a:t>
-            </a:r>
-            <a:r>
-              <a:rPr lang="pt-BR" sz="2400" dirty="0" err="1"/>
-              <a:t>Elit</a:t>
-            </a:r>
-            <a:endParaRPr lang="pt-BR" sz="2400" dirty="0"/>
-          </a:p>
-          <a:p>
-            <a:pPr marL="36900" lvl="0" indent="0" rtl="0">
-              <a:buNone/>
-            </a:pPr>
-            <a:r>
-              <a:rPr lang="pt-BR" sz="2400" dirty="0"/>
-              <a:t>Nunc </a:t>
-            </a:r>
-            <a:r>
-              <a:rPr lang="pt-BR" sz="2400" dirty="0" err="1"/>
-              <a:t>Viverra</a:t>
-            </a:r>
-            <a:endParaRPr lang="pt-BR" sz="2400" dirty="0"/>
-          </a:p>
-          <a:p>
-            <a:pPr marL="36900" lvl="0" indent="0" rtl="0">
-              <a:buNone/>
-            </a:pPr>
-            <a:r>
-              <a:rPr lang="pt-BR" sz="2400" dirty="0" err="1"/>
-              <a:t>Pellentesque</a:t>
-            </a:r>
-            <a:r>
-              <a:rPr lang="pt-BR" sz="2400" dirty="0"/>
-              <a:t> </a:t>
-            </a:r>
-            <a:r>
-              <a:rPr lang="pt-BR" sz="2400" dirty="0" err="1"/>
-              <a:t>Habitant</a:t>
-            </a:r>
-            <a:endParaRPr lang="pt-BR" sz="2400" dirty="0"/>
-          </a:p>
-          <a:p>
-            <a:pPr marL="36900" lvl="0" indent="0" rtl="0">
-              <a:buNone/>
-            </a:pPr>
-            <a:r>
-              <a:rPr lang="pt-BR" sz="2400" dirty="0" err="1"/>
-              <a:t>Lorem</a:t>
-            </a:r>
-            <a:r>
-              <a:rPr lang="pt-BR" sz="2400" dirty="0"/>
-              <a:t> Ipsum</a:t>
-            </a:r>
-          </a:p>
-          <a:p>
-            <a:pPr rtl="0"/>
-            <a:endParaRPr lang="pt-BR" sz="2400" dirty="0"/>
           </a:p>
         </p:txBody>
       </p:sp>
@@ -10946,16 +11940,348 @@
           </a:prstGeom>
         </p:spPr>
       </p:pic>
+      <p:sp>
+        <p:nvSpPr>
+          <p:cNvPr id="8" name="CaixaDeTexto 7">
+            <a:extLst>
+              <a:ext uri="{FF2B5EF4-FFF2-40B4-BE49-F238E27FC236}">
+                <a16:creationId xmlns:a16="http://schemas.microsoft.com/office/drawing/2014/main" id="{4588BCCF-525E-4699-95D3-459209BB867C}"/>
+              </a:ext>
+            </a:extLst>
+          </p:cNvPr>
+          <p:cNvSpPr txBox="1"/>
+          <p:nvPr/>
+        </p:nvSpPr>
+        <p:spPr>
+          <a:xfrm>
+            <a:off x="4159704" y="1230902"/>
+            <a:ext cx="7698920" cy="369332"/>
+          </a:xfrm>
+          <a:prstGeom prst="rect">
+            <a:avLst/>
+          </a:prstGeom>
+          <a:noFill/>
+        </p:spPr>
+        <p:txBody>
+          <a:bodyPr wrap="square">
+            <a:spAutoFit/>
+          </a:bodyPr>
+          <a:lstStyle/>
+          <a:p>
+            <a:endParaRPr lang="pt-BR" dirty="0"/>
+          </a:p>
+        </p:txBody>
+      </p:sp>
+      <p:sp>
+        <p:nvSpPr>
+          <p:cNvPr id="10" name="Espaço Reservado para Conteúdo 2">
+            <a:extLst>
+              <a:ext uri="{FF2B5EF4-FFF2-40B4-BE49-F238E27FC236}">
+                <a16:creationId xmlns:a16="http://schemas.microsoft.com/office/drawing/2014/main" id="{5949AAC4-E32F-4CFA-8A1F-368B3C28FEA4}"/>
+              </a:ext>
+            </a:extLst>
+          </p:cNvPr>
+          <p:cNvSpPr txBox="1">
+            <a:spLocks/>
+          </p:cNvSpPr>
+          <p:nvPr/>
+        </p:nvSpPr>
+        <p:spPr>
+          <a:xfrm>
+            <a:off x="5533844" y="1600234"/>
+            <a:ext cx="4403596" cy="4058751"/>
+          </a:xfrm>
+          <a:prstGeom prst="rect">
+            <a:avLst/>
+          </a:prstGeom>
+        </p:spPr>
+        <p:txBody>
+          <a:bodyPr vert="horz" lIns="91440" tIns="45720" rIns="91440" bIns="45720" rtlCol="0" anchor="t">
+            <a:noAutofit/>
+          </a:bodyPr>
+          <a:lstStyle>
+            <a:lvl1pPr marL="228600" indent="-228600" algn="l" defTabSz="914400" rtl="0" eaLnBrk="1" latinLnBrk="0" hangingPunct="1">
+              <a:lnSpc>
+                <a:spcPct val="110000"/>
+              </a:lnSpc>
+              <a:spcBef>
+                <a:spcPts val="700"/>
+              </a:spcBef>
+              <a:buClr>
+                <a:schemeClr val="tx2"/>
+              </a:buClr>
+              <a:buFont typeface="Arial" panose="020B0604020202020204" pitchFamily="34" charset="0"/>
+              <a:buChar char="•"/>
+              <a:defRPr sz="2000" kern="1200">
+                <a:solidFill>
+                  <a:schemeClr val="tx1">
+                    <a:lumMod val="65000"/>
+                    <a:lumOff val="35000"/>
+                  </a:schemeClr>
+                </a:solidFill>
+                <a:latin typeface="+mn-lt"/>
+                <a:ea typeface="+mn-ea"/>
+                <a:cs typeface="+mn-cs"/>
+              </a:defRPr>
+            </a:lvl1pPr>
+            <a:lvl2pPr marL="685800" indent="-228600" algn="l" defTabSz="914400" rtl="0" eaLnBrk="1" latinLnBrk="0" hangingPunct="1">
+              <a:lnSpc>
+                <a:spcPct val="110000"/>
+              </a:lnSpc>
+              <a:spcBef>
+                <a:spcPts val="700"/>
+              </a:spcBef>
+              <a:buClr>
+                <a:schemeClr val="tx2"/>
+              </a:buClr>
+              <a:buFont typeface="Gill Sans MT" panose="020B0502020104020203" pitchFamily="34" charset="0"/>
+              <a:buChar char="–"/>
+              <a:defRPr sz="1800" kern="1200">
+                <a:solidFill>
+                  <a:schemeClr val="tx1">
+                    <a:lumMod val="65000"/>
+                    <a:lumOff val="35000"/>
+                  </a:schemeClr>
+                </a:solidFill>
+                <a:latin typeface="+mn-lt"/>
+                <a:ea typeface="+mn-ea"/>
+                <a:cs typeface="+mn-cs"/>
+              </a:defRPr>
+            </a:lvl2pPr>
+            <a:lvl3pPr marL="1143000" indent="-228600" algn="l" defTabSz="914400" rtl="0" eaLnBrk="1" latinLnBrk="0" hangingPunct="1">
+              <a:lnSpc>
+                <a:spcPct val="110000"/>
+              </a:lnSpc>
+              <a:spcBef>
+                <a:spcPts val="700"/>
+              </a:spcBef>
+              <a:buClr>
+                <a:schemeClr val="tx2"/>
+              </a:buClr>
+              <a:buFont typeface="Arial" panose="020B0604020202020204" pitchFamily="34" charset="0"/>
+              <a:buChar char="•"/>
+              <a:defRPr sz="1600" kern="1200">
+                <a:solidFill>
+                  <a:schemeClr val="tx1">
+                    <a:lumMod val="65000"/>
+                    <a:lumOff val="35000"/>
+                  </a:schemeClr>
+                </a:solidFill>
+                <a:latin typeface="+mn-lt"/>
+                <a:ea typeface="+mn-ea"/>
+                <a:cs typeface="+mn-cs"/>
+              </a:defRPr>
+            </a:lvl3pPr>
+            <a:lvl4pPr marL="1600200" indent="-228600" algn="l" defTabSz="914400" rtl="0" eaLnBrk="1" latinLnBrk="0" hangingPunct="1">
+              <a:lnSpc>
+                <a:spcPct val="110000"/>
+              </a:lnSpc>
+              <a:spcBef>
+                <a:spcPts val="700"/>
+              </a:spcBef>
+              <a:buClr>
+                <a:schemeClr val="tx2"/>
+              </a:buClr>
+              <a:buFont typeface="Gill Sans MT" panose="020B0502020104020203" pitchFamily="34" charset="0"/>
+              <a:buChar char="–"/>
+              <a:defRPr sz="1400" kern="1200">
+                <a:solidFill>
+                  <a:schemeClr val="tx1">
+                    <a:lumMod val="65000"/>
+                    <a:lumOff val="35000"/>
+                  </a:schemeClr>
+                </a:solidFill>
+                <a:latin typeface="+mn-lt"/>
+                <a:ea typeface="+mn-ea"/>
+                <a:cs typeface="+mn-cs"/>
+              </a:defRPr>
+            </a:lvl4pPr>
+            <a:lvl5pPr marL="2057400" indent="-228600" algn="l" defTabSz="914400" rtl="0" eaLnBrk="1" latinLnBrk="0" hangingPunct="1">
+              <a:lnSpc>
+                <a:spcPct val="110000"/>
+              </a:lnSpc>
+              <a:spcBef>
+                <a:spcPts val="700"/>
+              </a:spcBef>
+              <a:buClr>
+                <a:schemeClr val="tx2"/>
+              </a:buClr>
+              <a:buFont typeface="Arial" panose="020B0604020202020204" pitchFamily="34" charset="0"/>
+              <a:buChar char="•"/>
+              <a:defRPr sz="1400" kern="1200">
+                <a:solidFill>
+                  <a:schemeClr val="tx1">
+                    <a:lumMod val="65000"/>
+                    <a:lumOff val="35000"/>
+                  </a:schemeClr>
+                </a:solidFill>
+                <a:latin typeface="+mn-lt"/>
+                <a:ea typeface="+mn-ea"/>
+                <a:cs typeface="+mn-cs"/>
+              </a:defRPr>
+            </a:lvl5pPr>
+            <a:lvl6pPr marL="2514600" indent="-228600" algn="l" defTabSz="914400" rtl="0" eaLnBrk="1" latinLnBrk="0" hangingPunct="1">
+              <a:lnSpc>
+                <a:spcPct val="110000"/>
+              </a:lnSpc>
+              <a:spcBef>
+                <a:spcPts val="700"/>
+              </a:spcBef>
+              <a:buClr>
+                <a:schemeClr val="tx2"/>
+              </a:buClr>
+              <a:buFont typeface="Gill Sans MT" panose="020B0502020104020203" pitchFamily="34" charset="0"/>
+              <a:buChar char="–"/>
+              <a:defRPr sz="1400" kern="1200">
+                <a:solidFill>
+                  <a:schemeClr val="tx1">
+                    <a:lumMod val="65000"/>
+                    <a:lumOff val="35000"/>
+                  </a:schemeClr>
+                </a:solidFill>
+                <a:latin typeface="+mn-lt"/>
+                <a:ea typeface="+mn-ea"/>
+                <a:cs typeface="+mn-cs"/>
+              </a:defRPr>
+            </a:lvl6pPr>
+            <a:lvl7pPr marL="2971800" indent="-228600" algn="l" defTabSz="914400" rtl="0" eaLnBrk="1" latinLnBrk="0" hangingPunct="1">
+              <a:lnSpc>
+                <a:spcPct val="110000"/>
+              </a:lnSpc>
+              <a:spcBef>
+                <a:spcPts val="700"/>
+              </a:spcBef>
+              <a:buClr>
+                <a:schemeClr val="tx2"/>
+              </a:buClr>
+              <a:buFont typeface="Arial" panose="020B0604020202020204" pitchFamily="34" charset="0"/>
+              <a:buChar char="•"/>
+              <a:defRPr sz="1400" kern="1200">
+                <a:solidFill>
+                  <a:schemeClr val="tx1">
+                    <a:lumMod val="65000"/>
+                    <a:lumOff val="35000"/>
+                  </a:schemeClr>
+                </a:solidFill>
+                <a:latin typeface="+mn-lt"/>
+                <a:ea typeface="+mn-ea"/>
+                <a:cs typeface="+mn-cs"/>
+              </a:defRPr>
+            </a:lvl7pPr>
+            <a:lvl8pPr marL="3429000" indent="-228600" algn="l" defTabSz="914400" rtl="0" eaLnBrk="1" latinLnBrk="0" hangingPunct="1">
+              <a:lnSpc>
+                <a:spcPct val="110000"/>
+              </a:lnSpc>
+              <a:spcBef>
+                <a:spcPts val="700"/>
+              </a:spcBef>
+              <a:buClr>
+                <a:schemeClr val="tx2"/>
+              </a:buClr>
+              <a:buFont typeface="Gill Sans MT" panose="020B0502020104020203" pitchFamily="34" charset="0"/>
+              <a:buChar char="–"/>
+              <a:defRPr sz="1400" kern="1200" baseline="0">
+                <a:solidFill>
+                  <a:schemeClr val="tx1">
+                    <a:lumMod val="65000"/>
+                    <a:lumOff val="35000"/>
+                  </a:schemeClr>
+                </a:solidFill>
+                <a:latin typeface="+mn-lt"/>
+                <a:ea typeface="+mn-ea"/>
+                <a:cs typeface="+mn-cs"/>
+              </a:defRPr>
+            </a:lvl8pPr>
+            <a:lvl9pPr marL="3886200" indent="-228600" algn="l" defTabSz="914400" rtl="0" eaLnBrk="1" latinLnBrk="0" hangingPunct="1">
+              <a:lnSpc>
+                <a:spcPct val="110000"/>
+              </a:lnSpc>
+              <a:spcBef>
+                <a:spcPts val="700"/>
+              </a:spcBef>
+              <a:buClr>
+                <a:schemeClr val="tx2"/>
+              </a:buClr>
+              <a:buFont typeface="Arial" panose="020B0604020202020204" pitchFamily="34" charset="0"/>
+              <a:buChar char="•"/>
+              <a:defRPr sz="1400" kern="1200" baseline="0">
+                <a:solidFill>
+                  <a:schemeClr val="tx1">
+                    <a:lumMod val="65000"/>
+                    <a:lumOff val="35000"/>
+                  </a:schemeClr>
+                </a:solidFill>
+                <a:latin typeface="+mn-lt"/>
+                <a:ea typeface="+mn-ea"/>
+                <a:cs typeface="+mn-cs"/>
+              </a:defRPr>
+            </a:lvl9pPr>
+          </a:lstStyle>
+          <a:p>
+            <a:pPr marL="36900" indent="0">
+              <a:buFont typeface="Arial" panose="020B0604020202020204" pitchFamily="34" charset="0"/>
+              <a:buNone/>
+            </a:pPr>
+            <a:endParaRPr lang="pt-BR" dirty="0"/>
+          </a:p>
+          <a:p>
+            <a:pPr>
+              <a:lnSpc>
+                <a:spcPct val="125000"/>
+              </a:lnSpc>
+              <a:spcAft>
+                <a:spcPts val="800"/>
+              </a:spcAft>
+              <a:buFont typeface="Wingdings" panose="05000000000000000000" pitchFamily="2" charset="2"/>
+              <a:buChar char="q"/>
+            </a:pPr>
+            <a:r>
+              <a:rPr lang="pt-BR" dirty="0">
+                <a:effectLst/>
+                <a:latin typeface="Arial" panose="020B0604020202020204" pitchFamily="34" charset="0"/>
+                <a:ea typeface="Times New Roman" panose="02020603050405020304" pitchFamily="18" charset="0"/>
+              </a:rPr>
+              <a:t>O Shopping Center (ou centro de compras) é uma edificação de grandes proporções, um empreendimento onde funcionam diversas lojas de diferentes donos e marcas. </a:t>
+            </a:r>
+            <a:r>
+              <a:rPr lang="pt-BR" dirty="0">
+                <a:latin typeface="Arial" panose="020B0604020202020204" pitchFamily="34" charset="0"/>
+                <a:ea typeface="Times New Roman" panose="02020603050405020304" pitchFamily="18" charset="0"/>
+              </a:rPr>
+              <a:t>Devido ao meio capitalista, as lojas de mais nome no mercado possuem melhores condições do que as empresas menores, e queremos equilibrar o mercado e retirar o forte domínio das lojas âncora.</a:t>
+            </a:r>
+            <a:endParaRPr lang="pt-BR" dirty="0"/>
+          </a:p>
+          <a:p>
+            <a:pPr>
+              <a:lnSpc>
+                <a:spcPct val="125000"/>
+              </a:lnSpc>
+              <a:spcAft>
+                <a:spcPts val="800"/>
+              </a:spcAft>
+              <a:buFont typeface="Wingdings" panose="05000000000000000000" pitchFamily="2" charset="2"/>
+              <a:buChar char="q"/>
+            </a:pPr>
+            <a:endParaRPr lang="pt-BR" dirty="0">
+              <a:latin typeface="Arial" panose="020B0604020202020204" pitchFamily="34" charset="0"/>
+            </a:endParaRPr>
+          </a:p>
+        </p:txBody>
+      </p:sp>
     </p:spTree>
     <p:extLst>
       <p:ext uri="{BB962C8B-B14F-4D97-AF65-F5344CB8AC3E}">
-        <p14:creationId xmlns:p14="http://schemas.microsoft.com/office/powerpoint/2010/main" val="1350381587"/>
+        <p14:creationId xmlns:p14="http://schemas.microsoft.com/office/powerpoint/2010/main" val="3635811442"/>
       </p:ext>
     </p:extLst>
   </p:cSld>
   <p:clrMapOvr>
     <a:masterClrMapping/>
   </p:clrMapOvr>
+  <p:transition spd="med">
+    <p:pull/>
+  </p:transition>
 </p:sld>
 </file>
 
@@ -11000,22 +12326,14 @@
         </p:spPr>
         <p:txBody>
           <a:bodyPr rtlCol="0" anchor="b">
-            <a:normAutofit fontScale="90000"/>
+            <a:normAutofit/>
           </a:bodyPr>
           <a:lstStyle/>
           <a:p>
             <a:pPr algn="l"/>
             <a:r>
               <a:rPr lang="pt-BR" sz="4000" dirty="0"/>
-              <a:t>Título </a:t>
-            </a:r>
-            <a:r>
-              <a:rPr lang="pt-BR" sz="4000" dirty="0" err="1"/>
-              <a:t>Lorem</a:t>
-            </a:r>
-            <a:r>
-              <a:rPr lang="pt-BR" sz="4000" dirty="0"/>
-              <a:t> Ipsum	</a:t>
+              <a:t>Problema</a:t>
             </a:r>
           </a:p>
         </p:txBody>
@@ -11048,97 +12366,30 @@
           </a:bodyPr>
           <a:lstStyle/>
           <a:p>
-            <a:pPr marL="36900" lvl="0" indent="0" rtl="0">
-              <a:buNone/>
+            <a:pPr>
+              <a:buFont typeface="Wingdings" panose="05000000000000000000" pitchFamily="2" charset="2"/>
+              <a:buChar char="q"/>
             </a:pPr>
             <a:r>
-              <a:rPr lang="pt-BR" sz="2400" dirty="0" err="1"/>
-              <a:t>Dolor</a:t>
+              <a:rPr lang="pt-BR" dirty="0">
+                <a:latin typeface="Arial" panose="020B0604020202020204" pitchFamily="34" charset="0"/>
+                <a:ea typeface="Times New Roman" panose="02020603050405020304" pitchFamily="18" charset="0"/>
+              </a:rPr>
+              <a:t>H</a:t>
             </a:r>
             <a:r>
-              <a:rPr lang="pt-BR" sz="2400" dirty="0"/>
-              <a:t> </a:t>
+              <a:rPr lang="pt-BR" dirty="0">
+                <a:effectLst/>
+                <a:latin typeface="Arial" panose="020B0604020202020204" pitchFamily="34" charset="0"/>
+                <a:ea typeface="Times New Roman" panose="02020603050405020304" pitchFamily="18" charset="0"/>
+              </a:rPr>
+              <a:t>oje os complexos comerciais funcionam sob o conceito de loja ancora e satélite, onde as lojas ancoras são o chamariz e as satélites são complemento, a desvantagem para o complexo comercial esta no poder de barganha.</a:t>
             </a:r>
-            <a:r>
-              <a:rPr lang="pt-BR" sz="2400" dirty="0" err="1"/>
-              <a:t>Sit</a:t>
-            </a:r>
-            <a:r>
-              <a:rPr lang="pt-BR" sz="2400" dirty="0"/>
-              <a:t> </a:t>
-            </a:r>
-            <a:r>
-              <a:rPr lang="pt-BR" sz="2400" dirty="0" err="1"/>
-              <a:t>Amet</a:t>
-            </a:r>
-            <a:endParaRPr lang="pt-BR" sz="2400" dirty="0"/>
-          </a:p>
-          <a:p>
-            <a:pPr marL="36900" lvl="0" indent="0" rtl="0">
-              <a:buNone/>
-            </a:pPr>
-            <a:r>
-              <a:rPr lang="pt-BR" sz="2400" dirty="0" err="1"/>
-              <a:t>Consectetuer</a:t>
-            </a:r>
-            <a:r>
-              <a:rPr lang="pt-BR" sz="2400" dirty="0"/>
-              <a:t> </a:t>
-            </a:r>
-            <a:r>
-              <a:rPr lang="pt-BR" sz="2400" dirty="0" err="1"/>
-              <a:t>Elit</a:t>
-            </a:r>
-            <a:endParaRPr lang="pt-BR" sz="2400" dirty="0"/>
-          </a:p>
-          <a:p>
-            <a:pPr marL="36900" lvl="0" indent="0" rtl="0">
-              <a:buNone/>
-            </a:pPr>
-            <a:r>
-              <a:rPr lang="pt-BR" sz="2400" dirty="0"/>
-              <a:t>Nunc </a:t>
-            </a:r>
-            <a:r>
-              <a:rPr lang="pt-BR" sz="2400" dirty="0" err="1"/>
-              <a:t>Viverra</a:t>
-            </a:r>
-            <a:endParaRPr lang="pt-BR" sz="2400" dirty="0"/>
-          </a:p>
-          <a:p>
-            <a:pPr marL="36900" lvl="0" indent="0" rtl="0">
-              <a:buNone/>
-            </a:pPr>
-            <a:r>
-              <a:rPr lang="pt-BR" sz="2400" dirty="0" err="1"/>
-              <a:t>Pellentesque</a:t>
-            </a:r>
-            <a:r>
-              <a:rPr lang="pt-BR" sz="2400" dirty="0"/>
-              <a:t> </a:t>
-            </a:r>
-            <a:r>
-              <a:rPr lang="pt-BR" sz="2400" dirty="0" err="1"/>
-              <a:t>Habitant</a:t>
-            </a:r>
-            <a:endParaRPr lang="pt-BR" sz="2400" dirty="0"/>
-          </a:p>
-          <a:p>
-            <a:pPr marL="36900" lvl="0" indent="0" rtl="0">
-              <a:buNone/>
-            </a:pPr>
-            <a:r>
-              <a:rPr lang="pt-BR" sz="2400" dirty="0" err="1"/>
-              <a:t>Lorem</a:t>
-            </a:r>
-            <a:r>
-              <a:rPr lang="pt-BR" sz="2400" dirty="0"/>
-              <a:t> Ipsum</a:t>
-            </a:r>
+            <a:endParaRPr lang="pt-BR" dirty="0"/>
           </a:p>
           <a:p>
             <a:pPr rtl="0"/>
-            <a:endParaRPr lang="pt-BR" sz="2400" dirty="0"/>
+            <a:endParaRPr lang="pt-BR" dirty="0"/>
           </a:p>
         </p:txBody>
       </p:sp>
@@ -11202,16 +12453,278 @@
           </a:prstGeom>
         </p:spPr>
       </p:pic>
+      <p:sp>
+        <p:nvSpPr>
+          <p:cNvPr id="8" name="Espaço Reservado para Conteúdo 2">
+            <a:extLst>
+              <a:ext uri="{FF2B5EF4-FFF2-40B4-BE49-F238E27FC236}">
+                <a16:creationId xmlns:a16="http://schemas.microsoft.com/office/drawing/2014/main" id="{4B7ACD8C-0CF9-4C10-9919-5DA6045275A3}"/>
+              </a:ext>
+            </a:extLst>
+          </p:cNvPr>
+          <p:cNvSpPr txBox="1">
+            <a:spLocks/>
+          </p:cNvSpPr>
+          <p:nvPr/>
+        </p:nvSpPr>
+        <p:spPr>
+          <a:xfrm>
+            <a:off x="5592989" y="2189647"/>
+            <a:ext cx="4403596" cy="4058751"/>
+          </a:xfrm>
+          <a:prstGeom prst="rect">
+            <a:avLst/>
+          </a:prstGeom>
+        </p:spPr>
+        <p:txBody>
+          <a:bodyPr vert="horz" lIns="91440" tIns="45720" rIns="91440" bIns="45720" rtlCol="0" anchor="t">
+            <a:normAutofit/>
+          </a:bodyPr>
+          <a:lstStyle>
+            <a:lvl1pPr marL="228600" indent="-228600" algn="l" defTabSz="914400" rtl="0" eaLnBrk="1" latinLnBrk="0" hangingPunct="1">
+              <a:lnSpc>
+                <a:spcPct val="110000"/>
+              </a:lnSpc>
+              <a:spcBef>
+                <a:spcPts val="700"/>
+              </a:spcBef>
+              <a:buClr>
+                <a:schemeClr val="tx2"/>
+              </a:buClr>
+              <a:buFont typeface="Arial" panose="020B0604020202020204" pitchFamily="34" charset="0"/>
+              <a:buChar char="•"/>
+              <a:defRPr sz="2000" kern="1200">
+                <a:solidFill>
+                  <a:schemeClr val="tx1">
+                    <a:lumMod val="65000"/>
+                    <a:lumOff val="35000"/>
+                  </a:schemeClr>
+                </a:solidFill>
+                <a:latin typeface="+mn-lt"/>
+                <a:ea typeface="+mn-ea"/>
+                <a:cs typeface="+mn-cs"/>
+              </a:defRPr>
+            </a:lvl1pPr>
+            <a:lvl2pPr marL="685800" indent="-228600" algn="l" defTabSz="914400" rtl="0" eaLnBrk="1" latinLnBrk="0" hangingPunct="1">
+              <a:lnSpc>
+                <a:spcPct val="110000"/>
+              </a:lnSpc>
+              <a:spcBef>
+                <a:spcPts val="700"/>
+              </a:spcBef>
+              <a:buClr>
+                <a:schemeClr val="tx2"/>
+              </a:buClr>
+              <a:buFont typeface="Gill Sans MT" panose="020B0502020104020203" pitchFamily="34" charset="0"/>
+              <a:buChar char="–"/>
+              <a:defRPr sz="1800" kern="1200">
+                <a:solidFill>
+                  <a:schemeClr val="tx1">
+                    <a:lumMod val="65000"/>
+                    <a:lumOff val="35000"/>
+                  </a:schemeClr>
+                </a:solidFill>
+                <a:latin typeface="+mn-lt"/>
+                <a:ea typeface="+mn-ea"/>
+                <a:cs typeface="+mn-cs"/>
+              </a:defRPr>
+            </a:lvl2pPr>
+            <a:lvl3pPr marL="1143000" indent="-228600" algn="l" defTabSz="914400" rtl="0" eaLnBrk="1" latinLnBrk="0" hangingPunct="1">
+              <a:lnSpc>
+                <a:spcPct val="110000"/>
+              </a:lnSpc>
+              <a:spcBef>
+                <a:spcPts val="700"/>
+              </a:spcBef>
+              <a:buClr>
+                <a:schemeClr val="tx2"/>
+              </a:buClr>
+              <a:buFont typeface="Arial" panose="020B0604020202020204" pitchFamily="34" charset="0"/>
+              <a:buChar char="•"/>
+              <a:defRPr sz="1600" kern="1200">
+                <a:solidFill>
+                  <a:schemeClr val="tx1">
+                    <a:lumMod val="65000"/>
+                    <a:lumOff val="35000"/>
+                  </a:schemeClr>
+                </a:solidFill>
+                <a:latin typeface="+mn-lt"/>
+                <a:ea typeface="+mn-ea"/>
+                <a:cs typeface="+mn-cs"/>
+              </a:defRPr>
+            </a:lvl3pPr>
+            <a:lvl4pPr marL="1600200" indent="-228600" algn="l" defTabSz="914400" rtl="0" eaLnBrk="1" latinLnBrk="0" hangingPunct="1">
+              <a:lnSpc>
+                <a:spcPct val="110000"/>
+              </a:lnSpc>
+              <a:spcBef>
+                <a:spcPts val="700"/>
+              </a:spcBef>
+              <a:buClr>
+                <a:schemeClr val="tx2"/>
+              </a:buClr>
+              <a:buFont typeface="Gill Sans MT" panose="020B0502020104020203" pitchFamily="34" charset="0"/>
+              <a:buChar char="–"/>
+              <a:defRPr sz="1400" kern="1200">
+                <a:solidFill>
+                  <a:schemeClr val="tx1">
+                    <a:lumMod val="65000"/>
+                    <a:lumOff val="35000"/>
+                  </a:schemeClr>
+                </a:solidFill>
+                <a:latin typeface="+mn-lt"/>
+                <a:ea typeface="+mn-ea"/>
+                <a:cs typeface="+mn-cs"/>
+              </a:defRPr>
+            </a:lvl4pPr>
+            <a:lvl5pPr marL="2057400" indent="-228600" algn="l" defTabSz="914400" rtl="0" eaLnBrk="1" latinLnBrk="0" hangingPunct="1">
+              <a:lnSpc>
+                <a:spcPct val="110000"/>
+              </a:lnSpc>
+              <a:spcBef>
+                <a:spcPts val="700"/>
+              </a:spcBef>
+              <a:buClr>
+                <a:schemeClr val="tx2"/>
+              </a:buClr>
+              <a:buFont typeface="Arial" panose="020B0604020202020204" pitchFamily="34" charset="0"/>
+              <a:buChar char="•"/>
+              <a:defRPr sz="1400" kern="1200">
+                <a:solidFill>
+                  <a:schemeClr val="tx1">
+                    <a:lumMod val="65000"/>
+                    <a:lumOff val="35000"/>
+                  </a:schemeClr>
+                </a:solidFill>
+                <a:latin typeface="+mn-lt"/>
+                <a:ea typeface="+mn-ea"/>
+                <a:cs typeface="+mn-cs"/>
+              </a:defRPr>
+            </a:lvl5pPr>
+            <a:lvl6pPr marL="2514600" indent="-228600" algn="l" defTabSz="914400" rtl="0" eaLnBrk="1" latinLnBrk="0" hangingPunct="1">
+              <a:lnSpc>
+                <a:spcPct val="110000"/>
+              </a:lnSpc>
+              <a:spcBef>
+                <a:spcPts val="700"/>
+              </a:spcBef>
+              <a:buClr>
+                <a:schemeClr val="tx2"/>
+              </a:buClr>
+              <a:buFont typeface="Gill Sans MT" panose="020B0502020104020203" pitchFamily="34" charset="0"/>
+              <a:buChar char="–"/>
+              <a:defRPr sz="1400" kern="1200">
+                <a:solidFill>
+                  <a:schemeClr val="tx1">
+                    <a:lumMod val="65000"/>
+                    <a:lumOff val="35000"/>
+                  </a:schemeClr>
+                </a:solidFill>
+                <a:latin typeface="+mn-lt"/>
+                <a:ea typeface="+mn-ea"/>
+                <a:cs typeface="+mn-cs"/>
+              </a:defRPr>
+            </a:lvl6pPr>
+            <a:lvl7pPr marL="2971800" indent="-228600" algn="l" defTabSz="914400" rtl="0" eaLnBrk="1" latinLnBrk="0" hangingPunct="1">
+              <a:lnSpc>
+                <a:spcPct val="110000"/>
+              </a:lnSpc>
+              <a:spcBef>
+                <a:spcPts val="700"/>
+              </a:spcBef>
+              <a:buClr>
+                <a:schemeClr val="tx2"/>
+              </a:buClr>
+              <a:buFont typeface="Arial" panose="020B0604020202020204" pitchFamily="34" charset="0"/>
+              <a:buChar char="•"/>
+              <a:defRPr sz="1400" kern="1200">
+                <a:solidFill>
+                  <a:schemeClr val="tx1">
+                    <a:lumMod val="65000"/>
+                    <a:lumOff val="35000"/>
+                  </a:schemeClr>
+                </a:solidFill>
+                <a:latin typeface="+mn-lt"/>
+                <a:ea typeface="+mn-ea"/>
+                <a:cs typeface="+mn-cs"/>
+              </a:defRPr>
+            </a:lvl7pPr>
+            <a:lvl8pPr marL="3429000" indent="-228600" algn="l" defTabSz="914400" rtl="0" eaLnBrk="1" latinLnBrk="0" hangingPunct="1">
+              <a:lnSpc>
+                <a:spcPct val="110000"/>
+              </a:lnSpc>
+              <a:spcBef>
+                <a:spcPts val="700"/>
+              </a:spcBef>
+              <a:buClr>
+                <a:schemeClr val="tx2"/>
+              </a:buClr>
+              <a:buFont typeface="Gill Sans MT" panose="020B0502020104020203" pitchFamily="34" charset="0"/>
+              <a:buChar char="–"/>
+              <a:defRPr sz="1400" kern="1200" baseline="0">
+                <a:solidFill>
+                  <a:schemeClr val="tx1">
+                    <a:lumMod val="65000"/>
+                    <a:lumOff val="35000"/>
+                  </a:schemeClr>
+                </a:solidFill>
+                <a:latin typeface="+mn-lt"/>
+                <a:ea typeface="+mn-ea"/>
+                <a:cs typeface="+mn-cs"/>
+              </a:defRPr>
+            </a:lvl8pPr>
+            <a:lvl9pPr marL="3886200" indent="-228600" algn="l" defTabSz="914400" rtl="0" eaLnBrk="1" latinLnBrk="0" hangingPunct="1">
+              <a:lnSpc>
+                <a:spcPct val="110000"/>
+              </a:lnSpc>
+              <a:spcBef>
+                <a:spcPts val="700"/>
+              </a:spcBef>
+              <a:buClr>
+                <a:schemeClr val="tx2"/>
+              </a:buClr>
+              <a:buFont typeface="Arial" panose="020B0604020202020204" pitchFamily="34" charset="0"/>
+              <a:buChar char="•"/>
+              <a:defRPr sz="1400" kern="1200" baseline="0">
+                <a:solidFill>
+                  <a:schemeClr val="tx1">
+                    <a:lumMod val="65000"/>
+                    <a:lumOff val="35000"/>
+                  </a:schemeClr>
+                </a:solidFill>
+                <a:latin typeface="+mn-lt"/>
+                <a:ea typeface="+mn-ea"/>
+                <a:cs typeface="+mn-cs"/>
+              </a:defRPr>
+            </a:lvl9pPr>
+          </a:lstStyle>
+          <a:p>
+            <a:pPr>
+              <a:buFont typeface="Wingdings" panose="05000000000000000000" pitchFamily="2" charset="2"/>
+              <a:buChar char="q"/>
+            </a:pPr>
+            <a:r>
+              <a:rPr lang="pt-BR" dirty="0">
+                <a:latin typeface="Arial" panose="020B0604020202020204" pitchFamily="34" charset="0"/>
+              </a:rPr>
+              <a:t>O caso das lojas satélites ainda possui maior agravante, sua rotatividade, por conta dos custos.</a:t>
+            </a:r>
+          </a:p>
+        </p:txBody>
+      </p:sp>
     </p:spTree>
     <p:extLst>
       <p:ext uri="{BB962C8B-B14F-4D97-AF65-F5344CB8AC3E}">
-        <p14:creationId xmlns:p14="http://schemas.microsoft.com/office/powerpoint/2010/main" val="479268457"/>
+        <p14:creationId xmlns:p14="http://schemas.microsoft.com/office/powerpoint/2010/main" val="1350381587"/>
       </p:ext>
     </p:extLst>
   </p:cSld>
   <p:clrMapOvr>
     <a:masterClrMapping/>
   </p:clrMapOvr>
+  <p:transition spd="med">
+    <p:pull/>
+  </p:transition>
 </p:sld>
 </file>
 
@@ -11250,7 +12763,7 @@
         </p:nvSpPr>
         <p:spPr>
           <a:xfrm>
-            <a:off x="1414093" y="609601"/>
+            <a:off x="1346829" y="1123951"/>
             <a:ext cx="4538124" cy="970450"/>
           </a:xfrm>
         </p:spPr>
@@ -11263,15 +12776,7 @@
             <a:pPr algn="l"/>
             <a:r>
               <a:rPr lang="pt-BR" sz="4000" dirty="0"/>
-              <a:t>Título </a:t>
-            </a:r>
-            <a:r>
-              <a:rPr lang="pt-BR" sz="4000" dirty="0" err="1"/>
-              <a:t>Lorem</a:t>
-            </a:r>
-            <a:r>
-              <a:rPr lang="pt-BR" sz="4000" dirty="0"/>
-              <a:t> Ipsum	</a:t>
+              <a:t>Desafio/solução	</a:t>
             </a:r>
           </a:p>
         </p:txBody>
@@ -11294,7 +12799,7 @@
         </p:nvSpPr>
         <p:spPr>
           <a:xfrm>
-            <a:off x="1414093" y="2189648"/>
+            <a:off x="5528871" y="2094401"/>
             <a:ext cx="4403596" cy="4058751"/>
           </a:xfrm>
         </p:spPr>
@@ -11304,97 +12809,28 @@
           </a:bodyPr>
           <a:lstStyle/>
           <a:p>
-            <a:pPr marL="36900" lvl="0" indent="0" rtl="0">
-              <a:buNone/>
+            <a:pPr marL="379800" lvl="0" indent="-342900" rtl="0">
+              <a:buFont typeface="Wingdings" panose="05000000000000000000" pitchFamily="2" charset="2"/>
+              <a:buChar char="q"/>
             </a:pPr>
             <a:r>
-              <a:rPr lang="pt-BR" sz="2400" dirty="0" err="1"/>
-              <a:t>Dolor</a:t>
+              <a:rPr lang="pt-BR" dirty="0">
+                <a:latin typeface="Arial" panose="020B0604020202020204" pitchFamily="34" charset="0"/>
+                <a:ea typeface="Times New Roman" panose="02020603050405020304" pitchFamily="18" charset="0"/>
+              </a:rPr>
+              <a:t>Desenvolver uma</a:t>
             </a:r>
             <a:r>
-              <a:rPr lang="pt-BR" sz="2400" dirty="0"/>
-              <a:t> </a:t>
+              <a:rPr lang="pt-BR" dirty="0">
+                <a:effectLst/>
+                <a:latin typeface="Arial" panose="020B0604020202020204" pitchFamily="34" charset="0"/>
+                <a:ea typeface="Times New Roman" panose="02020603050405020304" pitchFamily="18" charset="0"/>
+              </a:rPr>
+              <a:t> plataforma que fornece os dados obtidos através de sensores de proximidade, estruturados em totens que serão posicionados em lugares estratégicos, como escadas (rolantes ou estáticas), entradas / saídas e outros locais que sejam derivados do mesmo.</a:t>
             </a:r>
-            <a:r>
-              <a:rPr lang="pt-BR" sz="2400" dirty="0" err="1"/>
-              <a:t>Sit</a:t>
-            </a:r>
-            <a:r>
-              <a:rPr lang="pt-BR" sz="2400" dirty="0"/>
-              <a:t> </a:t>
-            </a:r>
-            <a:r>
-              <a:rPr lang="pt-BR" sz="2400" dirty="0" err="1"/>
-              <a:t>Amet</a:t>
-            </a:r>
-            <a:endParaRPr lang="pt-BR" sz="2400" dirty="0"/>
-          </a:p>
-          <a:p>
-            <a:pPr marL="36900" lvl="0" indent="0" rtl="0">
-              <a:buNone/>
-            </a:pPr>
-            <a:r>
-              <a:rPr lang="pt-BR" sz="2400" dirty="0" err="1"/>
-              <a:t>Consectetuer</a:t>
-            </a:r>
-            <a:r>
-              <a:rPr lang="pt-BR" sz="2400" dirty="0"/>
-              <a:t> </a:t>
-            </a:r>
-            <a:r>
-              <a:rPr lang="pt-BR" sz="2400" dirty="0" err="1"/>
-              <a:t>Elit</a:t>
-            </a:r>
-            <a:endParaRPr lang="pt-BR" sz="2400" dirty="0"/>
-          </a:p>
-          <a:p>
-            <a:pPr marL="36900" lvl="0" indent="0" rtl="0">
-              <a:buNone/>
-            </a:pPr>
-            <a:r>
-              <a:rPr lang="pt-BR" sz="2400" dirty="0"/>
-              <a:t>Nunc </a:t>
-            </a:r>
-            <a:r>
-              <a:rPr lang="pt-BR" sz="2400" dirty="0" err="1"/>
-              <a:t>Viverra</a:t>
-            </a:r>
-            <a:endParaRPr lang="pt-BR" sz="2400" dirty="0"/>
-          </a:p>
-          <a:p>
-            <a:pPr marL="36900" lvl="0" indent="0" rtl="0">
-              <a:buNone/>
-            </a:pPr>
-            <a:r>
-              <a:rPr lang="pt-BR" sz="2400" dirty="0" err="1"/>
-              <a:t>Pellentesque</a:t>
-            </a:r>
-            <a:r>
-              <a:rPr lang="pt-BR" sz="2400" dirty="0"/>
-              <a:t> </a:t>
-            </a:r>
-            <a:r>
-              <a:rPr lang="pt-BR" sz="2400" dirty="0" err="1"/>
-              <a:t>Habitant</a:t>
-            </a:r>
-            <a:endParaRPr lang="pt-BR" sz="2400" dirty="0"/>
-          </a:p>
-          <a:p>
-            <a:pPr marL="36900" lvl="0" indent="0" rtl="0">
-              <a:buNone/>
-            </a:pPr>
-            <a:r>
-              <a:rPr lang="pt-BR" sz="2400" dirty="0" err="1"/>
-              <a:t>Lorem</a:t>
-            </a:r>
-            <a:r>
-              <a:rPr lang="pt-BR" sz="2400" dirty="0"/>
-              <a:t> Ipsum</a:t>
-            </a:r>
-          </a:p>
-          <a:p>
-            <a:pPr rtl="0"/>
-            <a:endParaRPr lang="pt-BR" sz="2400" dirty="0"/>
+            <a:endParaRPr lang="pt-BR" dirty="0">
+              <a:latin typeface="Arial" panose="020B0604020202020204" pitchFamily="34" charset="0"/>
+            </a:endParaRPr>
           </a:p>
         </p:txBody>
       </p:sp>
@@ -11458,16 +12894,278 @@
           </a:prstGeom>
         </p:spPr>
       </p:pic>
+      <p:sp>
+        <p:nvSpPr>
+          <p:cNvPr id="8" name="Espaço Reservado para Conteúdo 2">
+            <a:extLst>
+              <a:ext uri="{FF2B5EF4-FFF2-40B4-BE49-F238E27FC236}">
+                <a16:creationId xmlns:a16="http://schemas.microsoft.com/office/drawing/2014/main" id="{ADFE492C-099D-4EF4-ABF9-3EF1CA4D89FB}"/>
+              </a:ext>
+            </a:extLst>
+          </p:cNvPr>
+          <p:cNvSpPr txBox="1">
+            <a:spLocks/>
+          </p:cNvSpPr>
+          <p:nvPr/>
+        </p:nvSpPr>
+        <p:spPr>
+          <a:xfrm>
+            <a:off x="1142890" y="2094401"/>
+            <a:ext cx="4403596" cy="4058751"/>
+          </a:xfrm>
+          <a:prstGeom prst="rect">
+            <a:avLst/>
+          </a:prstGeom>
+        </p:spPr>
+        <p:txBody>
+          <a:bodyPr vert="horz" lIns="91440" tIns="45720" rIns="91440" bIns="45720" rtlCol="0" anchor="t">
+            <a:normAutofit/>
+          </a:bodyPr>
+          <a:lstStyle>
+            <a:lvl1pPr marL="228600" indent="-228600" algn="l" defTabSz="914400" rtl="0" eaLnBrk="1" latinLnBrk="0" hangingPunct="1">
+              <a:lnSpc>
+                <a:spcPct val="110000"/>
+              </a:lnSpc>
+              <a:spcBef>
+                <a:spcPts val="700"/>
+              </a:spcBef>
+              <a:buClr>
+                <a:schemeClr val="tx2"/>
+              </a:buClr>
+              <a:buFont typeface="Arial" panose="020B0604020202020204" pitchFamily="34" charset="0"/>
+              <a:buChar char="•"/>
+              <a:defRPr sz="2000" kern="1200">
+                <a:solidFill>
+                  <a:schemeClr val="tx1">
+                    <a:lumMod val="65000"/>
+                    <a:lumOff val="35000"/>
+                  </a:schemeClr>
+                </a:solidFill>
+                <a:latin typeface="+mn-lt"/>
+                <a:ea typeface="+mn-ea"/>
+                <a:cs typeface="+mn-cs"/>
+              </a:defRPr>
+            </a:lvl1pPr>
+            <a:lvl2pPr marL="685800" indent="-228600" algn="l" defTabSz="914400" rtl="0" eaLnBrk="1" latinLnBrk="0" hangingPunct="1">
+              <a:lnSpc>
+                <a:spcPct val="110000"/>
+              </a:lnSpc>
+              <a:spcBef>
+                <a:spcPts val="700"/>
+              </a:spcBef>
+              <a:buClr>
+                <a:schemeClr val="tx2"/>
+              </a:buClr>
+              <a:buFont typeface="Gill Sans MT" panose="020B0502020104020203" pitchFamily="34" charset="0"/>
+              <a:buChar char="–"/>
+              <a:defRPr sz="1800" kern="1200">
+                <a:solidFill>
+                  <a:schemeClr val="tx1">
+                    <a:lumMod val="65000"/>
+                    <a:lumOff val="35000"/>
+                  </a:schemeClr>
+                </a:solidFill>
+                <a:latin typeface="+mn-lt"/>
+                <a:ea typeface="+mn-ea"/>
+                <a:cs typeface="+mn-cs"/>
+              </a:defRPr>
+            </a:lvl2pPr>
+            <a:lvl3pPr marL="1143000" indent="-228600" algn="l" defTabSz="914400" rtl="0" eaLnBrk="1" latinLnBrk="0" hangingPunct="1">
+              <a:lnSpc>
+                <a:spcPct val="110000"/>
+              </a:lnSpc>
+              <a:spcBef>
+                <a:spcPts val="700"/>
+              </a:spcBef>
+              <a:buClr>
+                <a:schemeClr val="tx2"/>
+              </a:buClr>
+              <a:buFont typeface="Arial" panose="020B0604020202020204" pitchFamily="34" charset="0"/>
+              <a:buChar char="•"/>
+              <a:defRPr sz="1600" kern="1200">
+                <a:solidFill>
+                  <a:schemeClr val="tx1">
+                    <a:lumMod val="65000"/>
+                    <a:lumOff val="35000"/>
+                  </a:schemeClr>
+                </a:solidFill>
+                <a:latin typeface="+mn-lt"/>
+                <a:ea typeface="+mn-ea"/>
+                <a:cs typeface="+mn-cs"/>
+              </a:defRPr>
+            </a:lvl3pPr>
+            <a:lvl4pPr marL="1600200" indent="-228600" algn="l" defTabSz="914400" rtl="0" eaLnBrk="1" latinLnBrk="0" hangingPunct="1">
+              <a:lnSpc>
+                <a:spcPct val="110000"/>
+              </a:lnSpc>
+              <a:spcBef>
+                <a:spcPts val="700"/>
+              </a:spcBef>
+              <a:buClr>
+                <a:schemeClr val="tx2"/>
+              </a:buClr>
+              <a:buFont typeface="Gill Sans MT" panose="020B0502020104020203" pitchFamily="34" charset="0"/>
+              <a:buChar char="–"/>
+              <a:defRPr sz="1400" kern="1200">
+                <a:solidFill>
+                  <a:schemeClr val="tx1">
+                    <a:lumMod val="65000"/>
+                    <a:lumOff val="35000"/>
+                  </a:schemeClr>
+                </a:solidFill>
+                <a:latin typeface="+mn-lt"/>
+                <a:ea typeface="+mn-ea"/>
+                <a:cs typeface="+mn-cs"/>
+              </a:defRPr>
+            </a:lvl4pPr>
+            <a:lvl5pPr marL="2057400" indent="-228600" algn="l" defTabSz="914400" rtl="0" eaLnBrk="1" latinLnBrk="0" hangingPunct="1">
+              <a:lnSpc>
+                <a:spcPct val="110000"/>
+              </a:lnSpc>
+              <a:spcBef>
+                <a:spcPts val="700"/>
+              </a:spcBef>
+              <a:buClr>
+                <a:schemeClr val="tx2"/>
+              </a:buClr>
+              <a:buFont typeface="Arial" panose="020B0604020202020204" pitchFamily="34" charset="0"/>
+              <a:buChar char="•"/>
+              <a:defRPr sz="1400" kern="1200">
+                <a:solidFill>
+                  <a:schemeClr val="tx1">
+                    <a:lumMod val="65000"/>
+                    <a:lumOff val="35000"/>
+                  </a:schemeClr>
+                </a:solidFill>
+                <a:latin typeface="+mn-lt"/>
+                <a:ea typeface="+mn-ea"/>
+                <a:cs typeface="+mn-cs"/>
+              </a:defRPr>
+            </a:lvl5pPr>
+            <a:lvl6pPr marL="2514600" indent="-228600" algn="l" defTabSz="914400" rtl="0" eaLnBrk="1" latinLnBrk="0" hangingPunct="1">
+              <a:lnSpc>
+                <a:spcPct val="110000"/>
+              </a:lnSpc>
+              <a:spcBef>
+                <a:spcPts val="700"/>
+              </a:spcBef>
+              <a:buClr>
+                <a:schemeClr val="tx2"/>
+              </a:buClr>
+              <a:buFont typeface="Gill Sans MT" panose="020B0502020104020203" pitchFamily="34" charset="0"/>
+              <a:buChar char="–"/>
+              <a:defRPr sz="1400" kern="1200">
+                <a:solidFill>
+                  <a:schemeClr val="tx1">
+                    <a:lumMod val="65000"/>
+                    <a:lumOff val="35000"/>
+                  </a:schemeClr>
+                </a:solidFill>
+                <a:latin typeface="+mn-lt"/>
+                <a:ea typeface="+mn-ea"/>
+                <a:cs typeface="+mn-cs"/>
+              </a:defRPr>
+            </a:lvl6pPr>
+            <a:lvl7pPr marL="2971800" indent="-228600" algn="l" defTabSz="914400" rtl="0" eaLnBrk="1" latinLnBrk="0" hangingPunct="1">
+              <a:lnSpc>
+                <a:spcPct val="110000"/>
+              </a:lnSpc>
+              <a:spcBef>
+                <a:spcPts val="700"/>
+              </a:spcBef>
+              <a:buClr>
+                <a:schemeClr val="tx2"/>
+              </a:buClr>
+              <a:buFont typeface="Arial" panose="020B0604020202020204" pitchFamily="34" charset="0"/>
+              <a:buChar char="•"/>
+              <a:defRPr sz="1400" kern="1200">
+                <a:solidFill>
+                  <a:schemeClr val="tx1">
+                    <a:lumMod val="65000"/>
+                    <a:lumOff val="35000"/>
+                  </a:schemeClr>
+                </a:solidFill>
+                <a:latin typeface="+mn-lt"/>
+                <a:ea typeface="+mn-ea"/>
+                <a:cs typeface="+mn-cs"/>
+              </a:defRPr>
+            </a:lvl7pPr>
+            <a:lvl8pPr marL="3429000" indent="-228600" algn="l" defTabSz="914400" rtl="0" eaLnBrk="1" latinLnBrk="0" hangingPunct="1">
+              <a:lnSpc>
+                <a:spcPct val="110000"/>
+              </a:lnSpc>
+              <a:spcBef>
+                <a:spcPts val="700"/>
+              </a:spcBef>
+              <a:buClr>
+                <a:schemeClr val="tx2"/>
+              </a:buClr>
+              <a:buFont typeface="Gill Sans MT" panose="020B0502020104020203" pitchFamily="34" charset="0"/>
+              <a:buChar char="–"/>
+              <a:defRPr sz="1400" kern="1200" baseline="0">
+                <a:solidFill>
+                  <a:schemeClr val="tx1">
+                    <a:lumMod val="65000"/>
+                    <a:lumOff val="35000"/>
+                  </a:schemeClr>
+                </a:solidFill>
+                <a:latin typeface="+mn-lt"/>
+                <a:ea typeface="+mn-ea"/>
+                <a:cs typeface="+mn-cs"/>
+              </a:defRPr>
+            </a:lvl8pPr>
+            <a:lvl9pPr marL="3886200" indent="-228600" algn="l" defTabSz="914400" rtl="0" eaLnBrk="1" latinLnBrk="0" hangingPunct="1">
+              <a:lnSpc>
+                <a:spcPct val="110000"/>
+              </a:lnSpc>
+              <a:spcBef>
+                <a:spcPts val="700"/>
+              </a:spcBef>
+              <a:buClr>
+                <a:schemeClr val="tx2"/>
+              </a:buClr>
+              <a:buFont typeface="Arial" panose="020B0604020202020204" pitchFamily="34" charset="0"/>
+              <a:buChar char="•"/>
+              <a:defRPr sz="1400" kern="1200" baseline="0">
+                <a:solidFill>
+                  <a:schemeClr val="tx1">
+                    <a:lumMod val="65000"/>
+                    <a:lumOff val="35000"/>
+                  </a:schemeClr>
+                </a:solidFill>
+                <a:latin typeface="+mn-lt"/>
+                <a:ea typeface="+mn-ea"/>
+                <a:cs typeface="+mn-cs"/>
+              </a:defRPr>
+            </a:lvl9pPr>
+          </a:lstStyle>
+          <a:p>
+            <a:pPr marL="379800" indent="-342900">
+              <a:buFont typeface="Wingdings" panose="05000000000000000000" pitchFamily="2" charset="2"/>
+              <a:buChar char="q"/>
+            </a:pPr>
+            <a:r>
+              <a:rPr lang="pt-BR" dirty="0">
+                <a:latin typeface="Arial" panose="020B0604020202020204" pitchFamily="34" charset="0"/>
+              </a:rPr>
+              <a:t>Uma nova visão para as administradoras de complexos comerciais, logo iremos fornecer um sistema que as ajude a colocar o complexo em evidência, tirando assim, o peso que as lojas ancoras possuem, valorizando o lugar e aumentando o lucro.</a:t>
+            </a:r>
+          </a:p>
+        </p:txBody>
+      </p:sp>
     </p:spTree>
     <p:extLst>
       <p:ext uri="{BB962C8B-B14F-4D97-AF65-F5344CB8AC3E}">
-        <p14:creationId xmlns:p14="http://schemas.microsoft.com/office/powerpoint/2010/main" val="3635811442"/>
+        <p14:creationId xmlns:p14="http://schemas.microsoft.com/office/powerpoint/2010/main" val="479268457"/>
       </p:ext>
     </p:extLst>
   </p:cSld>
   <p:clrMapOvr>
     <a:masterClrMapping/>
   </p:clrMapOvr>
+  <p:transition spd="med">
+    <p:pull/>
+  </p:transition>
 </p:sld>
 </file>
 
@@ -11506,8 +13204,8 @@
         </p:nvSpPr>
         <p:spPr>
           <a:xfrm>
-            <a:off x="1414093" y="609601"/>
-            <a:ext cx="4538124" cy="970450"/>
+            <a:off x="1303557" y="340179"/>
+            <a:ext cx="7060436" cy="970450"/>
           </a:xfrm>
         </p:spPr>
         <p:txBody>
@@ -11519,138 +13217,8 @@
             <a:pPr algn="l"/>
             <a:r>
               <a:rPr lang="pt-BR" sz="4000" dirty="0"/>
-              <a:t>Título </a:t>
+              <a:t>Diagrama de visão de negócio</a:t>
             </a:r>
-            <a:r>
-              <a:rPr lang="pt-BR" sz="4000" dirty="0" err="1"/>
-              <a:t>Lorem</a:t>
-            </a:r>
-            <a:r>
-              <a:rPr lang="pt-BR" sz="4000" dirty="0"/>
-              <a:t> Ipsum	</a:t>
-            </a:r>
-          </a:p>
-        </p:txBody>
-      </p:sp>
-      <p:sp>
-        <p:nvSpPr>
-          <p:cNvPr id="24" name="Espaço Reservado para Conteúdo 2">
-            <a:extLst>
-              <a:ext uri="{FF2B5EF4-FFF2-40B4-BE49-F238E27FC236}">
-                <a16:creationId xmlns:a16="http://schemas.microsoft.com/office/drawing/2014/main" id="{F260476B-CCA6-412B-A9C5-399C34AE6F05}"/>
-              </a:ext>
-            </a:extLst>
-          </p:cNvPr>
-          <p:cNvSpPr>
-            <a:spLocks noGrp="1"/>
-          </p:cNvSpPr>
-          <p:nvPr>
-            <p:ph idx="1"/>
-          </p:nvPr>
-        </p:nvSpPr>
-        <p:spPr>
-          <a:xfrm>
-            <a:off x="1414093" y="2189648"/>
-            <a:ext cx="4403596" cy="4058751"/>
-          </a:xfrm>
-        </p:spPr>
-        <p:txBody>
-          <a:bodyPr rtlCol="0" anchor="t">
-            <a:normAutofit/>
-          </a:bodyPr>
-          <a:lstStyle/>
-          <a:p>
-            <a:pPr marL="36900" lvl="0" indent="0" rtl="0">
-              <a:buNone/>
-            </a:pPr>
-            <a:r>
-              <a:rPr lang="pt-BR" sz="2400" dirty="0" err="1"/>
-              <a:t>Dolor</a:t>
-            </a:r>
-            <a:r>
-              <a:rPr lang="pt-BR" sz="2400" dirty="0"/>
-              <a:t> </a:t>
-            </a:r>
-            <a:r>
-              <a:rPr lang="pt-BR" sz="2400" dirty="0" err="1"/>
-              <a:t>Sit</a:t>
-            </a:r>
-            <a:r>
-              <a:rPr lang="pt-BR" sz="2400" dirty="0"/>
-              <a:t> </a:t>
-            </a:r>
-            <a:r>
-              <a:rPr lang="pt-BR" sz="2400" dirty="0" err="1"/>
-              <a:t>Amet</a:t>
-            </a:r>
-            <a:endParaRPr lang="pt-BR" sz="2400" dirty="0"/>
-          </a:p>
-          <a:p>
-            <a:pPr marL="36900" lvl="0" indent="0" rtl="0">
-              <a:buNone/>
-            </a:pPr>
-            <a:r>
-              <a:rPr lang="pt-BR" sz="2400" dirty="0" err="1"/>
-              <a:t>Consectetuer</a:t>
-            </a:r>
-            <a:r>
-              <a:rPr lang="pt-BR" sz="2400" dirty="0"/>
-              <a:t> </a:t>
-            </a:r>
-            <a:r>
-              <a:rPr lang="pt-BR" sz="2400" dirty="0" err="1"/>
-              <a:t>Elit</a:t>
-            </a:r>
-            <a:endParaRPr lang="pt-BR" sz="2400" dirty="0"/>
-          </a:p>
-          <a:p>
-            <a:pPr marL="36900" lvl="0" indent="0" rtl="0">
-              <a:buNone/>
-            </a:pPr>
-            <a:r>
-              <a:rPr lang="pt-BR" sz="2400" dirty="0"/>
-              <a:t>Nunc </a:t>
-            </a:r>
-            <a:r>
-              <a:rPr lang="pt-BR" sz="2400" dirty="0" err="1"/>
-              <a:t>Viverra</a:t>
-            </a:r>
-            <a:endParaRPr lang="pt-BR" sz="2400" dirty="0"/>
-          </a:p>
-          <a:p>
-            <a:pPr marL="36900" lvl="0" indent="0" rtl="0">
-              <a:buNone/>
-            </a:pPr>
-            <a:r>
-              <a:rPr lang="pt-BR" sz="2400" dirty="0" err="1"/>
-              <a:t>Pellentesque</a:t>
-            </a:r>
-            <a:r>
-              <a:rPr lang="pt-BR" sz="2400" dirty="0"/>
-              <a:t> </a:t>
-            </a:r>
-            <a:r>
-              <a:rPr lang="pt-BR" sz="2400" dirty="0" err="1"/>
-              <a:t>Habitant</a:t>
-            </a:r>
-            <a:endParaRPr lang="pt-BR" sz="2400" dirty="0"/>
-          </a:p>
-          <a:p>
-            <a:pPr marL="36900" lvl="0" indent="0" rtl="0">
-              <a:buNone/>
-            </a:pPr>
-            <a:r>
-              <a:rPr lang="pt-BR" sz="2400" dirty="0" err="1"/>
-              <a:t>Lorem</a:t>
-            </a:r>
-            <a:r>
-              <a:rPr lang="pt-BR" sz="2400" dirty="0"/>
-              <a:t> Ipsum</a:t>
-            </a:r>
-          </a:p>
-          <a:p>
-            <a:pPr rtl="0"/>
-            <a:endParaRPr lang="pt-BR" sz="2400" dirty="0"/>
           </a:p>
         </p:txBody>
       </p:sp>
@@ -11714,6 +13282,36 @@
           </a:prstGeom>
         </p:spPr>
       </p:pic>
+      <p:pic>
+        <p:nvPicPr>
+          <p:cNvPr id="7" name="Imagem 6">
+            <a:extLst>
+              <a:ext uri="{FF2B5EF4-FFF2-40B4-BE49-F238E27FC236}">
+                <a16:creationId xmlns:a16="http://schemas.microsoft.com/office/drawing/2014/main" id="{10223401-9A90-4E6B-AA4C-839C0605C93B}"/>
+              </a:ext>
+            </a:extLst>
+          </p:cNvPr>
+          <p:cNvPicPr>
+            <a:picLocks noChangeAspect="1"/>
+          </p:cNvPicPr>
+          <p:nvPr/>
+        </p:nvPicPr>
+        <p:blipFill>
+          <a:blip r:embed="rId5"/>
+          <a:stretch>
+            <a:fillRect/>
+          </a:stretch>
+        </p:blipFill>
+        <p:spPr>
+          <a:xfrm>
+            <a:off x="1303558" y="1310629"/>
+            <a:ext cx="7226294" cy="5161639"/>
+          </a:xfrm>
+          <a:prstGeom prst="rect">
+            <a:avLst/>
+          </a:prstGeom>
+        </p:spPr>
+      </p:pic>
     </p:spTree>
     <p:extLst>
       <p:ext uri="{BB962C8B-B14F-4D97-AF65-F5344CB8AC3E}">
@@ -11724,6 +13322,9 @@
   <p:clrMapOvr>
     <a:masterClrMapping/>
   </p:clrMapOvr>
+  <p:transition spd="med">
+    <p:pull/>
+  </p:transition>
 </p:sld>
 </file>
 
@@ -11762,8 +13363,8 @@
         </p:nvSpPr>
         <p:spPr>
           <a:xfrm>
-            <a:off x="1414093" y="609601"/>
-            <a:ext cx="4538124" cy="970450"/>
+            <a:off x="3304650" y="2875927"/>
+            <a:ext cx="5582700" cy="970450"/>
           </a:xfrm>
         </p:spPr>
         <p:txBody>
@@ -11774,139 +13375,13 @@
           <a:p>
             <a:pPr algn="l"/>
             <a:r>
-              <a:rPr lang="pt-BR" sz="4000" dirty="0"/>
-              <a:t>Título </a:t>
-            </a:r>
-            <a:r>
-              <a:rPr lang="pt-BR" sz="4000" dirty="0" err="1"/>
-              <a:t>Lorem</a:t>
+              <a:rPr lang="pt-BR" sz="4400" dirty="0"/>
+              <a:t>Ferramenta de gestão</a:t>
             </a:r>
             <a:r>
               <a:rPr lang="pt-BR" sz="4000" dirty="0"/>
-              <a:t> Ipsum	</a:t>
+              <a:t>	</a:t>
             </a:r>
-          </a:p>
-        </p:txBody>
-      </p:sp>
-      <p:sp>
-        <p:nvSpPr>
-          <p:cNvPr id="24" name="Espaço Reservado para Conteúdo 2">
-            <a:extLst>
-              <a:ext uri="{FF2B5EF4-FFF2-40B4-BE49-F238E27FC236}">
-                <a16:creationId xmlns:a16="http://schemas.microsoft.com/office/drawing/2014/main" id="{F260476B-CCA6-412B-A9C5-399C34AE6F05}"/>
-              </a:ext>
-            </a:extLst>
-          </p:cNvPr>
-          <p:cNvSpPr>
-            <a:spLocks noGrp="1"/>
-          </p:cNvSpPr>
-          <p:nvPr>
-            <p:ph idx="1"/>
-          </p:nvPr>
-        </p:nvSpPr>
-        <p:spPr>
-          <a:xfrm>
-            <a:off x="1414093" y="2189648"/>
-            <a:ext cx="4403596" cy="4058751"/>
-          </a:xfrm>
-        </p:spPr>
-        <p:txBody>
-          <a:bodyPr rtlCol="0" anchor="t">
-            <a:normAutofit/>
-          </a:bodyPr>
-          <a:lstStyle/>
-          <a:p>
-            <a:pPr marL="36900" lvl="0" indent="0" rtl="0">
-              <a:buNone/>
-            </a:pPr>
-            <a:r>
-              <a:rPr lang="pt-BR" sz="2400" dirty="0" err="1"/>
-              <a:t>Dolor</a:t>
-            </a:r>
-            <a:r>
-              <a:rPr lang="pt-BR" sz="2400" dirty="0"/>
-              <a:t> </a:t>
-            </a:r>
-            <a:r>
-              <a:rPr lang="pt-BR" sz="2400" dirty="0" err="1"/>
-              <a:t>Sit</a:t>
-            </a:r>
-            <a:r>
-              <a:rPr lang="pt-BR" sz="2400" dirty="0"/>
-              <a:t> </a:t>
-            </a:r>
-            <a:r>
-              <a:rPr lang="pt-BR" sz="2400" dirty="0" err="1"/>
-              <a:t>Amet</a:t>
-            </a:r>
-            <a:endParaRPr lang="pt-BR" sz="2400" dirty="0"/>
-          </a:p>
-          <a:p>
-            <a:pPr marL="36900" lvl="0" indent="0" rtl="0">
-              <a:buNone/>
-            </a:pPr>
-            <a:r>
-              <a:rPr lang="pt-BR" sz="2400" dirty="0" err="1"/>
-              <a:t>Consectetuer</a:t>
-            </a:r>
-            <a:r>
-              <a:rPr lang="pt-BR" sz="2400" dirty="0"/>
-              <a:t> </a:t>
-            </a:r>
-            <a:r>
-              <a:rPr lang="pt-BR" sz="2400" dirty="0" err="1"/>
-              <a:t>Elit</a:t>
-            </a:r>
-            <a:endParaRPr lang="pt-BR" sz="2400" dirty="0"/>
-          </a:p>
-          <a:p>
-            <a:pPr marL="36900" lvl="0" indent="0" rtl="0">
-              <a:buNone/>
-            </a:pPr>
-            <a:r>
-              <a:rPr lang="pt-BR" sz="2400" dirty="0"/>
-              <a:t>Nunc </a:t>
-            </a:r>
-            <a:r>
-              <a:rPr lang="pt-BR" sz="2400" dirty="0" err="1"/>
-              <a:t>Viverra</a:t>
-            </a:r>
-            <a:endParaRPr lang="pt-BR" sz="2400" dirty="0"/>
-          </a:p>
-          <a:p>
-            <a:pPr marL="36900" lvl="0" indent="0" rtl="0">
-              <a:buNone/>
-            </a:pPr>
-            <a:r>
-              <a:rPr lang="pt-BR" sz="2400" dirty="0" err="1"/>
-              <a:t>Pellentesque</a:t>
-            </a:r>
-            <a:r>
-              <a:rPr lang="pt-BR" sz="2400" dirty="0"/>
-              <a:t> </a:t>
-            </a:r>
-            <a:r>
-              <a:rPr lang="pt-BR" sz="2400" dirty="0" err="1"/>
-              <a:t>Habitant</a:t>
-            </a:r>
-            <a:endParaRPr lang="pt-BR" sz="2400" dirty="0"/>
-          </a:p>
-          <a:p>
-            <a:pPr marL="36900" lvl="0" indent="0" rtl="0">
-              <a:buNone/>
-            </a:pPr>
-            <a:r>
-              <a:rPr lang="pt-BR" sz="2400" dirty="0" err="1"/>
-              <a:t>Lorem</a:t>
-            </a:r>
-            <a:r>
-              <a:rPr lang="pt-BR" sz="2400" dirty="0"/>
-              <a:t> Ipsum</a:t>
-            </a:r>
-          </a:p>
-          <a:p>
-            <a:pPr rtl="0"/>
-            <a:endParaRPr lang="pt-BR" sz="2400" dirty="0"/>
           </a:p>
         </p:txBody>
       </p:sp>
@@ -11980,6 +13455,9 @@
   <p:clrMapOvr>
     <a:masterClrMapping/>
   </p:clrMapOvr>
+  <p:transition spd="med">
+    <p:pull/>
+  </p:transition>
 </p:sld>
 </file>
 
@@ -12018,7 +13496,7 @@
         </p:nvSpPr>
         <p:spPr>
           <a:xfrm>
-            <a:off x="1414093" y="609601"/>
+            <a:off x="1100839" y="988144"/>
             <a:ext cx="4538124" cy="970450"/>
           </a:xfrm>
         </p:spPr>
@@ -12031,138 +13509,8 @@
             <a:pPr algn="l"/>
             <a:r>
               <a:rPr lang="pt-BR" sz="4000" dirty="0"/>
-              <a:t>Título </a:t>
+              <a:t>Site institucional	</a:t>
             </a:r>
-            <a:r>
-              <a:rPr lang="pt-BR" sz="4000" dirty="0" err="1"/>
-              <a:t>Lorem</a:t>
-            </a:r>
-            <a:r>
-              <a:rPr lang="pt-BR" sz="4000" dirty="0"/>
-              <a:t> Ipsum	</a:t>
-            </a:r>
-          </a:p>
-        </p:txBody>
-      </p:sp>
-      <p:sp>
-        <p:nvSpPr>
-          <p:cNvPr id="24" name="Espaço Reservado para Conteúdo 2">
-            <a:extLst>
-              <a:ext uri="{FF2B5EF4-FFF2-40B4-BE49-F238E27FC236}">
-                <a16:creationId xmlns:a16="http://schemas.microsoft.com/office/drawing/2014/main" id="{F260476B-CCA6-412B-A9C5-399C34AE6F05}"/>
-              </a:ext>
-            </a:extLst>
-          </p:cNvPr>
-          <p:cNvSpPr>
-            <a:spLocks noGrp="1"/>
-          </p:cNvSpPr>
-          <p:nvPr>
-            <p:ph idx="1"/>
-          </p:nvPr>
-        </p:nvSpPr>
-        <p:spPr>
-          <a:xfrm>
-            <a:off x="1414093" y="2189648"/>
-            <a:ext cx="4403596" cy="4058751"/>
-          </a:xfrm>
-        </p:spPr>
-        <p:txBody>
-          <a:bodyPr rtlCol="0" anchor="t">
-            <a:normAutofit/>
-          </a:bodyPr>
-          <a:lstStyle/>
-          <a:p>
-            <a:pPr marL="36900" lvl="0" indent="0" rtl="0">
-              <a:buNone/>
-            </a:pPr>
-            <a:r>
-              <a:rPr lang="pt-BR" sz="2400" dirty="0" err="1"/>
-              <a:t>Dolor</a:t>
-            </a:r>
-            <a:r>
-              <a:rPr lang="pt-BR" sz="2400" dirty="0"/>
-              <a:t> </a:t>
-            </a:r>
-            <a:r>
-              <a:rPr lang="pt-BR" sz="2400" dirty="0" err="1"/>
-              <a:t>Sit</a:t>
-            </a:r>
-            <a:r>
-              <a:rPr lang="pt-BR" sz="2400" dirty="0"/>
-              <a:t> </a:t>
-            </a:r>
-            <a:r>
-              <a:rPr lang="pt-BR" sz="2400" dirty="0" err="1"/>
-              <a:t>Amet</a:t>
-            </a:r>
-            <a:endParaRPr lang="pt-BR" sz="2400" dirty="0"/>
-          </a:p>
-          <a:p>
-            <a:pPr marL="36900" lvl="0" indent="0" rtl="0">
-              <a:buNone/>
-            </a:pPr>
-            <a:r>
-              <a:rPr lang="pt-BR" sz="2400" dirty="0" err="1"/>
-              <a:t>Consectetuer</a:t>
-            </a:r>
-            <a:r>
-              <a:rPr lang="pt-BR" sz="2400" dirty="0"/>
-              <a:t> </a:t>
-            </a:r>
-            <a:r>
-              <a:rPr lang="pt-BR" sz="2400" dirty="0" err="1"/>
-              <a:t>Elit</a:t>
-            </a:r>
-            <a:endParaRPr lang="pt-BR" sz="2400" dirty="0"/>
-          </a:p>
-          <a:p>
-            <a:pPr marL="36900" lvl="0" indent="0" rtl="0">
-              <a:buNone/>
-            </a:pPr>
-            <a:r>
-              <a:rPr lang="pt-BR" sz="2400" dirty="0"/>
-              <a:t>Nunc </a:t>
-            </a:r>
-            <a:r>
-              <a:rPr lang="pt-BR" sz="2400" dirty="0" err="1"/>
-              <a:t>Viverra</a:t>
-            </a:r>
-            <a:endParaRPr lang="pt-BR" sz="2400" dirty="0"/>
-          </a:p>
-          <a:p>
-            <a:pPr marL="36900" lvl="0" indent="0" rtl="0">
-              <a:buNone/>
-            </a:pPr>
-            <a:r>
-              <a:rPr lang="pt-BR" sz="2400" dirty="0" err="1"/>
-              <a:t>Pellentesque</a:t>
-            </a:r>
-            <a:r>
-              <a:rPr lang="pt-BR" sz="2400" dirty="0"/>
-              <a:t> </a:t>
-            </a:r>
-            <a:r>
-              <a:rPr lang="pt-BR" sz="2400" dirty="0" err="1"/>
-              <a:t>Habitant</a:t>
-            </a:r>
-            <a:endParaRPr lang="pt-BR" sz="2400" dirty="0"/>
-          </a:p>
-          <a:p>
-            <a:pPr marL="36900" lvl="0" indent="0" rtl="0">
-              <a:buNone/>
-            </a:pPr>
-            <a:r>
-              <a:rPr lang="pt-BR" sz="2400" dirty="0" err="1"/>
-              <a:t>Lorem</a:t>
-            </a:r>
-            <a:r>
-              <a:rPr lang="pt-BR" sz="2400" dirty="0"/>
-              <a:t> Ipsum</a:t>
-            </a:r>
-          </a:p>
-          <a:p>
-            <a:pPr rtl="0"/>
-            <a:endParaRPr lang="pt-BR" sz="2400" dirty="0"/>
           </a:p>
         </p:txBody>
       </p:sp>
@@ -12226,6 +13574,36 @@
           </a:prstGeom>
         </p:spPr>
       </p:pic>
+      <p:pic>
+        <p:nvPicPr>
+          <p:cNvPr id="6" name="Imagem 5">
+            <a:extLst>
+              <a:ext uri="{FF2B5EF4-FFF2-40B4-BE49-F238E27FC236}">
+                <a16:creationId xmlns:a16="http://schemas.microsoft.com/office/drawing/2014/main" id="{B0987B23-5A2E-41AA-B23C-B0720F061FE6}"/>
+              </a:ext>
+            </a:extLst>
+          </p:cNvPr>
+          <p:cNvPicPr>
+            <a:picLocks noChangeAspect="1"/>
+          </p:cNvPicPr>
+          <p:nvPr/>
+        </p:nvPicPr>
+        <p:blipFill>
+          <a:blip r:embed="rId5"/>
+          <a:stretch>
+            <a:fillRect/>
+          </a:stretch>
+        </p:blipFill>
+        <p:spPr>
+          <a:xfrm>
+            <a:off x="1215139" y="1473370"/>
+            <a:ext cx="8074753" cy="4396486"/>
+          </a:xfrm>
+          <a:prstGeom prst="rect">
+            <a:avLst/>
+          </a:prstGeom>
+        </p:spPr>
+      </p:pic>
     </p:spTree>
     <p:extLst>
       <p:ext uri="{BB962C8B-B14F-4D97-AF65-F5344CB8AC3E}">
@@ -12236,6 +13614,9 @@
   <p:clrMapOvr>
     <a:masterClrMapping/>
   </p:clrMapOvr>
+  <p:transition spd="med">
+    <p:pull/>
+  </p:transition>
 </p:sld>
 </file>
 

</xml_diff>